<commit_message>
readme file and qr-code for poster repository
</commit_message>
<xml_diff>
--- a/JDH_poster_spacing_rearrangefig4.pptx
+++ b/JDH_poster_spacing_rearrangefig4.pptx
@@ -4436,36 +4436,6 @@
           </a:p>
         </p:txBody>
       </p:sp>
-      <p:pic>
-        <p:nvPicPr>
-          <p:cNvPr id="68" name="Picture 67" descr="A qr code with a cat logo&#10;&#10;Description automatically generated with medium confidence">
-            <a:extLst>
-              <a:ext uri="{FF2B5EF4-FFF2-40B4-BE49-F238E27FC236}">
-                <a16:creationId xmlns:a16="http://schemas.microsoft.com/office/drawing/2014/main" id="{EECB6682-1C2F-88F4-B085-4C3AF4E40827}"/>
-              </a:ext>
-            </a:extLst>
-          </p:cNvPr>
-          <p:cNvPicPr>
-            <a:picLocks noChangeAspect="1"/>
-          </p:cNvPicPr>
-          <p:nvPr/>
-        </p:nvPicPr>
-        <p:blipFill>
-          <a:blip r:embed="rId8"/>
-          <a:stretch>
-            <a:fillRect/>
-          </a:stretch>
-        </p:blipFill>
-        <p:spPr>
-          <a:xfrm>
-            <a:off x="332619" y="3717360"/>
-            <a:ext cx="1938528" cy="1938528"/>
-          </a:xfrm>
-          <a:prstGeom prst="rect">
-            <a:avLst/>
-          </a:prstGeom>
-        </p:spPr>
-      </p:pic>
       <p:grpSp>
         <p:nvGrpSpPr>
           <p:cNvPr id="341" name="Group 340">
@@ -4501,7 +4471,7 @@
             <p:nvPr/>
           </p:nvPicPr>
           <p:blipFill>
-            <a:blip r:embed="rId9"/>
+            <a:blip r:embed="rId8"/>
             <a:stretch>
               <a:fillRect/>
             </a:stretch>
@@ -4761,7 +4731,7 @@
           <p:nvPr/>
         </p:nvPicPr>
         <p:blipFill rotWithShape="1">
-          <a:blip r:embed="rId10">
+          <a:blip r:embed="rId9">
             <a:alphaModFix/>
           </a:blip>
           <a:srcRect r="48348"/>
@@ -4796,7 +4766,7 @@
           <p:nvPr/>
         </p:nvPicPr>
         <p:blipFill>
-          <a:blip r:embed="rId11"/>
+          <a:blip r:embed="rId10"/>
           <a:stretch>
             <a:fillRect/>
           </a:stretch>
@@ -4905,7 +4875,7 @@
             <p:nvPr/>
           </p:nvPicPr>
           <p:blipFill>
-            <a:blip r:embed="rId12"/>
+            <a:blip r:embed="rId11"/>
             <a:stretch>
               <a:fillRect/>
             </a:stretch>
@@ -4936,7 +4906,7 @@
           <p:nvPr/>
         </p:nvPicPr>
         <p:blipFill rotWithShape="1">
-          <a:blip r:embed="rId10">
+          <a:blip r:embed="rId9">
             <a:alphaModFix/>
           </a:blip>
           <a:srcRect l="51652"/>
@@ -5025,7 +4995,7 @@
           <p:nvPr/>
         </p:nvPicPr>
         <p:blipFill>
-          <a:blip r:embed="rId13"/>
+          <a:blip r:embed="rId12"/>
           <a:stretch>
             <a:fillRect/>
           </a:stretch>
@@ -5406,6 +5376,41 @@
           </p:cNvPr>
           <p:cNvPicPr preferRelativeResize="0">
             <a:picLocks/>
+          </p:cNvPicPr>
+          <p:nvPr/>
+        </p:nvPicPr>
+        <p:blipFill rotWithShape="1">
+          <a:blip r:embed="rId13">
+            <a:alphaModFix/>
+          </a:blip>
+          <a:srcRect l="6074" t="52954" r="5732" b="6308"/>
+          <a:stretch/>
+        </p:blipFill>
+        <p:spPr>
+          <a:xfrm>
+            <a:off x="17233190" y="11894630"/>
+            <a:ext cx="4893153" cy="3386371"/>
+          </a:xfrm>
+          <a:prstGeom prst="rect">
+            <a:avLst/>
+          </a:prstGeom>
+          <a:noFill/>
+          <a:ln>
+            <a:noFill/>
+          </a:ln>
+        </p:spPr>
+      </p:pic>
+      <p:pic>
+        <p:nvPicPr>
+          <p:cNvPr id="222" name="Google Shape;680;p39">
+            <a:extLst>
+              <a:ext uri="{FF2B5EF4-FFF2-40B4-BE49-F238E27FC236}">
+                <a16:creationId xmlns:a16="http://schemas.microsoft.com/office/drawing/2014/main" id="{D6688F48-13F9-8EF8-8FDB-BC778A857A22}"/>
+              </a:ext>
+            </a:extLst>
+          </p:cNvPr>
+          <p:cNvPicPr preferRelativeResize="0">
+            <a:picLocks noChangeAspect="1"/>
           </p:cNvPicPr>
           <p:nvPr/>
         </p:nvPicPr>
@@ -5413,13 +5418,13 @@
           <a:blip r:embed="rId14">
             <a:alphaModFix/>
           </a:blip>
-          <a:srcRect l="6074" t="52954" r="5732" b="6308"/>
+          <a:srcRect b="51905"/>
           <a:stretch/>
         </p:blipFill>
         <p:spPr>
           <a:xfrm>
-            <a:off x="17233190" y="11894630"/>
-            <a:ext cx="4893153" cy="3386371"/>
+            <a:off x="26570361" y="11546367"/>
+            <a:ext cx="4486440" cy="3489763"/>
           </a:xfrm>
           <a:prstGeom prst="rect">
             <a:avLst/>
@@ -5432,10 +5437,10 @@
       </p:pic>
       <p:pic>
         <p:nvPicPr>
-          <p:cNvPr id="222" name="Google Shape;680;p39">
-            <a:extLst>
-              <a:ext uri="{FF2B5EF4-FFF2-40B4-BE49-F238E27FC236}">
-                <a16:creationId xmlns:a16="http://schemas.microsoft.com/office/drawing/2014/main" id="{D6688F48-13F9-8EF8-8FDB-BC778A857A22}"/>
+          <p:cNvPr id="161" name="Google Shape;566;p36">
+            <a:extLst>
+              <a:ext uri="{FF2B5EF4-FFF2-40B4-BE49-F238E27FC236}">
+                <a16:creationId xmlns:a16="http://schemas.microsoft.com/office/drawing/2014/main" id="{5A0ABFF1-2B5A-C4F2-C96E-E1B0D1A1A4AC}"/>
               </a:ext>
             </a:extLst>
           </p:cNvPr>
@@ -5444,43 +5449,8 @@
           </p:cNvPicPr>
           <p:nvPr/>
         </p:nvPicPr>
-        <p:blipFill rotWithShape="1">
+        <p:blipFill>
           <a:blip r:embed="rId15">
-            <a:alphaModFix/>
-          </a:blip>
-          <a:srcRect b="51905"/>
-          <a:stretch/>
-        </p:blipFill>
-        <p:spPr>
-          <a:xfrm>
-            <a:off x="26570361" y="11546367"/>
-            <a:ext cx="4486440" cy="3489763"/>
-          </a:xfrm>
-          <a:prstGeom prst="rect">
-            <a:avLst/>
-          </a:prstGeom>
-          <a:noFill/>
-          <a:ln>
-            <a:noFill/>
-          </a:ln>
-        </p:spPr>
-      </p:pic>
-      <p:pic>
-        <p:nvPicPr>
-          <p:cNvPr id="161" name="Google Shape;566;p36">
-            <a:extLst>
-              <a:ext uri="{FF2B5EF4-FFF2-40B4-BE49-F238E27FC236}">
-                <a16:creationId xmlns:a16="http://schemas.microsoft.com/office/drawing/2014/main" id="{5A0ABFF1-2B5A-C4F2-C96E-E1B0D1A1A4AC}"/>
-              </a:ext>
-            </a:extLst>
-          </p:cNvPr>
-          <p:cNvPicPr preferRelativeResize="0">
-            <a:picLocks noChangeAspect="1"/>
-          </p:cNvPicPr>
-          <p:nvPr/>
-        </p:nvPicPr>
-        <p:blipFill>
-          <a:blip r:embed="rId16">
             <a:alphaModFix/>
           </a:blip>
           <a:stretch>
@@ -5903,7 +5873,7 @@
           <p:nvPr/>
         </p:nvPicPr>
         <p:blipFill rotWithShape="1">
-          <a:blip r:embed="rId17">
+          <a:blip r:embed="rId16">
             <a:alphaModFix/>
           </a:blip>
           <a:srcRect l="6635" b="6889"/>
@@ -5938,7 +5908,7 @@
           <p:nvPr/>
         </p:nvPicPr>
         <p:blipFill rotWithShape="1">
-          <a:blip r:embed="rId18">
+          <a:blip r:embed="rId17">
             <a:alphaModFix/>
           </a:blip>
           <a:srcRect l="5482" b="6695"/>
@@ -5964,6 +5934,40 @@
             <a:extLst>
               <a:ext uri="{FF2B5EF4-FFF2-40B4-BE49-F238E27FC236}">
                 <a16:creationId xmlns:a16="http://schemas.microsoft.com/office/drawing/2014/main" id="{FFB4143E-F515-DCAB-5218-D9B33B3ACEEF}"/>
+              </a:ext>
+            </a:extLst>
+          </p:cNvPr>
+          <p:cNvPicPr preferRelativeResize="0"/>
+          <p:nvPr/>
+        </p:nvPicPr>
+        <p:blipFill>
+          <a:blip r:embed="rId18">
+            <a:alphaModFix/>
+          </a:blip>
+          <a:stretch>
+            <a:fillRect/>
+          </a:stretch>
+        </p:blipFill>
+        <p:spPr>
+          <a:xfrm>
+            <a:off x="23674469" y="8639808"/>
+            <a:ext cx="248146" cy="209527"/>
+          </a:xfrm>
+          <a:prstGeom prst="rect">
+            <a:avLst/>
+          </a:prstGeom>
+          <a:noFill/>
+          <a:ln>
+            <a:noFill/>
+          </a:ln>
+        </p:spPr>
+      </p:pic>
+      <p:pic>
+        <p:nvPicPr>
+          <p:cNvPr id="174" name="Google Shape;538;p35">
+            <a:extLst>
+              <a:ext uri="{FF2B5EF4-FFF2-40B4-BE49-F238E27FC236}">
+                <a16:creationId xmlns:a16="http://schemas.microsoft.com/office/drawing/2014/main" id="{D461FDD5-8C3C-349A-06C0-F6543FC9F981}"/>
               </a:ext>
             </a:extLst>
           </p:cNvPr>
@@ -5980,8 +5984,8 @@
         </p:blipFill>
         <p:spPr>
           <a:xfrm>
-            <a:off x="23674469" y="8639808"/>
-            <a:ext cx="248146" cy="209527"/>
+            <a:off x="23658025" y="8026591"/>
+            <a:ext cx="275053" cy="209527"/>
           </a:xfrm>
           <a:prstGeom prst="rect">
             <a:avLst/>
@@ -5994,10 +5998,78 @@
       </p:pic>
       <p:pic>
         <p:nvPicPr>
-          <p:cNvPr id="174" name="Google Shape;538;p35">
-            <a:extLst>
-              <a:ext uri="{FF2B5EF4-FFF2-40B4-BE49-F238E27FC236}">
-                <a16:creationId xmlns:a16="http://schemas.microsoft.com/office/drawing/2014/main" id="{D461FDD5-8C3C-349A-06C0-F6543FC9F981}"/>
+          <p:cNvPr id="175" name="Google Shape;539;p35">
+            <a:extLst>
+              <a:ext uri="{FF2B5EF4-FFF2-40B4-BE49-F238E27FC236}">
+                <a16:creationId xmlns:a16="http://schemas.microsoft.com/office/drawing/2014/main" id="{768DD41D-183E-46CD-8ED3-CE55E2FF8517}"/>
+              </a:ext>
+            </a:extLst>
+          </p:cNvPr>
+          <p:cNvPicPr preferRelativeResize="0"/>
+          <p:nvPr/>
+        </p:nvPicPr>
+        <p:blipFill>
+          <a:blip r:embed="rId18">
+            <a:alphaModFix/>
+          </a:blip>
+          <a:stretch>
+            <a:fillRect/>
+          </a:stretch>
+        </p:blipFill>
+        <p:spPr>
+          <a:xfrm>
+            <a:off x="27575081" y="8598878"/>
+            <a:ext cx="248146" cy="209527"/>
+          </a:xfrm>
+          <a:prstGeom prst="rect">
+            <a:avLst/>
+          </a:prstGeom>
+          <a:noFill/>
+          <a:ln>
+            <a:noFill/>
+          </a:ln>
+        </p:spPr>
+      </p:pic>
+      <p:pic>
+        <p:nvPicPr>
+          <p:cNvPr id="176" name="Google Shape;540;p35">
+            <a:extLst>
+              <a:ext uri="{FF2B5EF4-FFF2-40B4-BE49-F238E27FC236}">
+                <a16:creationId xmlns:a16="http://schemas.microsoft.com/office/drawing/2014/main" id="{A7E264D6-3A1D-4EE4-1696-629E3D9F6AC4}"/>
+              </a:ext>
+            </a:extLst>
+          </p:cNvPr>
+          <p:cNvPicPr preferRelativeResize="0"/>
+          <p:nvPr/>
+        </p:nvPicPr>
+        <p:blipFill>
+          <a:blip r:embed="rId19">
+            <a:alphaModFix/>
+          </a:blip>
+          <a:stretch>
+            <a:fillRect/>
+          </a:stretch>
+        </p:blipFill>
+        <p:spPr>
+          <a:xfrm>
+            <a:off x="27561627" y="8030166"/>
+            <a:ext cx="275053" cy="209527"/>
+          </a:xfrm>
+          <a:prstGeom prst="rect">
+            <a:avLst/>
+          </a:prstGeom>
+          <a:noFill/>
+          <a:ln>
+            <a:noFill/>
+          </a:ln>
+        </p:spPr>
+      </p:pic>
+      <p:pic>
+        <p:nvPicPr>
+          <p:cNvPr id="177" name="Google Shape;541;p35">
+            <a:extLst>
+              <a:ext uri="{FF2B5EF4-FFF2-40B4-BE49-F238E27FC236}">
+                <a16:creationId xmlns:a16="http://schemas.microsoft.com/office/drawing/2014/main" id="{219F3905-FC06-8005-6C23-8594F2BBE5C9}"/>
               </a:ext>
             </a:extLst>
           </p:cNvPr>
@@ -6014,8 +6086,8 @@
         </p:blipFill>
         <p:spPr>
           <a:xfrm>
-            <a:off x="23658025" y="8026591"/>
-            <a:ext cx="275053" cy="209527"/>
+            <a:off x="27587757" y="9262147"/>
+            <a:ext cx="254125" cy="209527"/>
           </a:xfrm>
           <a:prstGeom prst="rect">
             <a:avLst/>
@@ -6028,44 +6100,10 @@
       </p:pic>
       <p:pic>
         <p:nvPicPr>
-          <p:cNvPr id="175" name="Google Shape;539;p35">
-            <a:extLst>
-              <a:ext uri="{FF2B5EF4-FFF2-40B4-BE49-F238E27FC236}">
-                <a16:creationId xmlns:a16="http://schemas.microsoft.com/office/drawing/2014/main" id="{768DD41D-183E-46CD-8ED3-CE55E2FF8517}"/>
-              </a:ext>
-            </a:extLst>
-          </p:cNvPr>
-          <p:cNvPicPr preferRelativeResize="0"/>
-          <p:nvPr/>
-        </p:nvPicPr>
-        <p:blipFill>
-          <a:blip r:embed="rId19">
-            <a:alphaModFix/>
-          </a:blip>
-          <a:stretch>
-            <a:fillRect/>
-          </a:stretch>
-        </p:blipFill>
-        <p:spPr>
-          <a:xfrm>
-            <a:off x="27575081" y="8598878"/>
-            <a:ext cx="248146" cy="209527"/>
-          </a:xfrm>
-          <a:prstGeom prst="rect">
-            <a:avLst/>
-          </a:prstGeom>
-          <a:noFill/>
-          <a:ln>
-            <a:noFill/>
-          </a:ln>
-        </p:spPr>
-      </p:pic>
-      <p:pic>
-        <p:nvPicPr>
-          <p:cNvPr id="176" name="Google Shape;540;p35">
-            <a:extLst>
-              <a:ext uri="{FF2B5EF4-FFF2-40B4-BE49-F238E27FC236}">
-                <a16:creationId xmlns:a16="http://schemas.microsoft.com/office/drawing/2014/main" id="{A7E264D6-3A1D-4EE4-1696-629E3D9F6AC4}"/>
+          <p:cNvPr id="178" name="Google Shape;543;p35">
+            <a:extLst>
+              <a:ext uri="{FF2B5EF4-FFF2-40B4-BE49-F238E27FC236}">
+                <a16:creationId xmlns:a16="http://schemas.microsoft.com/office/drawing/2014/main" id="{E0CA6BBF-564D-236E-2DAD-FA53D87EDF18}"/>
               </a:ext>
             </a:extLst>
           </p:cNvPr>
@@ -6082,8 +6120,8 @@
         </p:blipFill>
         <p:spPr>
           <a:xfrm>
-            <a:off x="27561627" y="8030166"/>
-            <a:ext cx="275053" cy="209527"/>
+            <a:off x="23668490" y="9199029"/>
+            <a:ext cx="254125" cy="209527"/>
           </a:xfrm>
           <a:prstGeom prst="rect">
             <a:avLst/>
@@ -6096,10 +6134,10 @@
       </p:pic>
       <p:pic>
         <p:nvPicPr>
-          <p:cNvPr id="177" name="Google Shape;541;p35">
-            <a:extLst>
-              <a:ext uri="{FF2B5EF4-FFF2-40B4-BE49-F238E27FC236}">
-                <a16:creationId xmlns:a16="http://schemas.microsoft.com/office/drawing/2014/main" id="{219F3905-FC06-8005-6C23-8594F2BBE5C9}"/>
+          <p:cNvPr id="181" name="Google Shape;542;p35">
+            <a:extLst>
+              <a:ext uri="{FF2B5EF4-FFF2-40B4-BE49-F238E27FC236}">
+                <a16:creationId xmlns:a16="http://schemas.microsoft.com/office/drawing/2014/main" id="{5BA3A1E9-0F22-F7C8-D533-4731437DB6F6}"/>
               </a:ext>
             </a:extLst>
           </p:cNvPr>
@@ -6116,8 +6154,8 @@
         </p:blipFill>
         <p:spPr>
           <a:xfrm>
-            <a:off x="27587757" y="9262147"/>
-            <a:ext cx="254125" cy="209527"/>
+            <a:off x="28760899" y="9521731"/>
+            <a:ext cx="281033" cy="209527"/>
           </a:xfrm>
           <a:prstGeom prst="rect">
             <a:avLst/>
@@ -6130,48 +6168,16 @@
       </p:pic>
       <p:pic>
         <p:nvPicPr>
-          <p:cNvPr id="178" name="Google Shape;543;p35">
-            <a:extLst>
-              <a:ext uri="{FF2B5EF4-FFF2-40B4-BE49-F238E27FC236}">
-                <a16:creationId xmlns:a16="http://schemas.microsoft.com/office/drawing/2014/main" id="{E0CA6BBF-564D-236E-2DAD-FA53D87EDF18}"/>
-              </a:ext>
-            </a:extLst>
-          </p:cNvPr>
-          <p:cNvPicPr preferRelativeResize="0"/>
-          <p:nvPr/>
-        </p:nvPicPr>
-        <p:blipFill>
-          <a:blip r:embed="rId21">
-            <a:alphaModFix/>
-          </a:blip>
-          <a:stretch>
-            <a:fillRect/>
-          </a:stretch>
-        </p:blipFill>
-        <p:spPr>
-          <a:xfrm>
-            <a:off x="23668490" y="9199029"/>
-            <a:ext cx="254125" cy="209527"/>
-          </a:xfrm>
-          <a:prstGeom prst="rect">
-            <a:avLst/>
-          </a:prstGeom>
-          <a:noFill/>
-          <a:ln>
-            <a:noFill/>
-          </a:ln>
-        </p:spPr>
-      </p:pic>
-      <p:pic>
-        <p:nvPicPr>
-          <p:cNvPr id="181" name="Google Shape;542;p35">
-            <a:extLst>
-              <a:ext uri="{FF2B5EF4-FFF2-40B4-BE49-F238E27FC236}">
-                <a16:creationId xmlns:a16="http://schemas.microsoft.com/office/drawing/2014/main" id="{5BA3A1E9-0F22-F7C8-D533-4731437DB6F6}"/>
-              </a:ext>
-            </a:extLst>
-          </p:cNvPr>
-          <p:cNvPicPr preferRelativeResize="0"/>
+          <p:cNvPr id="183" name="Google Shape;531;p35">
+            <a:extLst>
+              <a:ext uri="{FF2B5EF4-FFF2-40B4-BE49-F238E27FC236}">
+                <a16:creationId xmlns:a16="http://schemas.microsoft.com/office/drawing/2014/main" id="{48435EE2-373A-4886-A90C-F44CCE918631}"/>
+              </a:ext>
+            </a:extLst>
+          </p:cNvPr>
+          <p:cNvPicPr preferRelativeResize="0">
+            <a:picLocks noChangeAspect="1"/>
+          </p:cNvPicPr>
           <p:nvPr/>
         </p:nvPicPr>
         <p:blipFill>
@@ -6184,8 +6190,8 @@
         </p:blipFill>
         <p:spPr>
           <a:xfrm>
-            <a:off x="28760899" y="9521731"/>
-            <a:ext cx="281033" cy="209527"/>
+            <a:off x="19350866" y="8099320"/>
+            <a:ext cx="680046" cy="230480"/>
           </a:xfrm>
           <a:prstGeom prst="rect">
             <a:avLst/>
@@ -6198,10 +6204,10 @@
       </p:pic>
       <p:pic>
         <p:nvPicPr>
-          <p:cNvPr id="183" name="Google Shape;531;p35">
-            <a:extLst>
-              <a:ext uri="{FF2B5EF4-FFF2-40B4-BE49-F238E27FC236}">
-                <a16:creationId xmlns:a16="http://schemas.microsoft.com/office/drawing/2014/main" id="{48435EE2-373A-4886-A90C-F44CCE918631}"/>
+          <p:cNvPr id="185" name="Google Shape;543;p35">
+            <a:extLst>
+              <a:ext uri="{FF2B5EF4-FFF2-40B4-BE49-F238E27FC236}">
+                <a16:creationId xmlns:a16="http://schemas.microsoft.com/office/drawing/2014/main" id="{236FB07F-10F7-5101-3E29-5A7CEADD5F79}"/>
               </a:ext>
             </a:extLst>
           </p:cNvPr>
@@ -6211,43 +6217,7 @@
           <p:nvPr/>
         </p:nvPicPr>
         <p:blipFill>
-          <a:blip r:embed="rId23">
-            <a:alphaModFix/>
-          </a:blip>
-          <a:stretch>
-            <a:fillRect/>
-          </a:stretch>
-        </p:blipFill>
-        <p:spPr>
-          <a:xfrm>
-            <a:off x="19350866" y="8099320"/>
-            <a:ext cx="680046" cy="230480"/>
-          </a:xfrm>
-          <a:prstGeom prst="rect">
-            <a:avLst/>
-          </a:prstGeom>
-          <a:noFill/>
-          <a:ln>
-            <a:noFill/>
-          </a:ln>
-        </p:spPr>
-      </p:pic>
-      <p:pic>
-        <p:nvPicPr>
-          <p:cNvPr id="185" name="Google Shape;543;p35">
-            <a:extLst>
-              <a:ext uri="{FF2B5EF4-FFF2-40B4-BE49-F238E27FC236}">
-                <a16:creationId xmlns:a16="http://schemas.microsoft.com/office/drawing/2014/main" id="{236FB07F-10F7-5101-3E29-5A7CEADD5F79}"/>
-              </a:ext>
-            </a:extLst>
-          </p:cNvPr>
-          <p:cNvPicPr preferRelativeResize="0">
-            <a:picLocks noChangeAspect="1"/>
-          </p:cNvPicPr>
-          <p:nvPr/>
-        </p:nvPicPr>
-        <p:blipFill>
-          <a:blip r:embed="rId21">
+          <a:blip r:embed="rId20">
             <a:alphaModFix/>
           </a:blip>
           <a:stretch>
@@ -6654,7 +6624,7 @@
           <p:nvPr/>
         </p:nvPicPr>
         <p:blipFill rotWithShape="1">
-          <a:blip r:embed="rId17">
+          <a:blip r:embed="rId16">
             <a:alphaModFix/>
           </a:blip>
           <a:srcRect l="6635" b="6889"/>
@@ -6919,7 +6889,7 @@
           <p:nvPr/>
         </p:nvPicPr>
         <p:blipFill>
-          <a:blip r:embed="rId12"/>
+          <a:blip r:embed="rId11"/>
           <a:stretch>
             <a:fillRect/>
           </a:stretch>
@@ -7069,6 +7039,40 @@
           <p:nvPr/>
         </p:nvPicPr>
         <p:blipFill>
+          <a:blip r:embed="rId18">
+            <a:alphaModFix/>
+          </a:blip>
+          <a:stretch>
+            <a:fillRect/>
+          </a:stretch>
+        </p:blipFill>
+        <p:spPr>
+          <a:xfrm>
+            <a:off x="27442131" y="12826116"/>
+            <a:ext cx="248146" cy="209527"/>
+          </a:xfrm>
+          <a:prstGeom prst="rect">
+            <a:avLst/>
+          </a:prstGeom>
+          <a:noFill/>
+          <a:ln>
+            <a:noFill/>
+          </a:ln>
+        </p:spPr>
+      </p:pic>
+      <p:pic>
+        <p:nvPicPr>
+          <p:cNvPr id="246" name="Google Shape;540;p35">
+            <a:extLst>
+              <a:ext uri="{FF2B5EF4-FFF2-40B4-BE49-F238E27FC236}">
+                <a16:creationId xmlns:a16="http://schemas.microsoft.com/office/drawing/2014/main" id="{354CE78D-A473-C761-AFD1-F08EA50BA203}"/>
+              </a:ext>
+            </a:extLst>
+          </p:cNvPr>
+          <p:cNvPicPr preferRelativeResize="0"/>
+          <p:nvPr/>
+        </p:nvPicPr>
+        <p:blipFill>
           <a:blip r:embed="rId19">
             <a:alphaModFix/>
           </a:blip>
@@ -7078,8 +7082,8 @@
         </p:blipFill>
         <p:spPr>
           <a:xfrm>
-            <a:off x="27442131" y="12826116"/>
-            <a:ext cx="248146" cy="209527"/>
+            <a:off x="27415224" y="12238443"/>
+            <a:ext cx="275053" cy="209527"/>
           </a:xfrm>
           <a:prstGeom prst="rect">
             <a:avLst/>
@@ -7092,10 +7096,10 @@
       </p:pic>
       <p:pic>
         <p:nvPicPr>
-          <p:cNvPr id="246" name="Google Shape;540;p35">
-            <a:extLst>
-              <a:ext uri="{FF2B5EF4-FFF2-40B4-BE49-F238E27FC236}">
-                <a16:creationId xmlns:a16="http://schemas.microsoft.com/office/drawing/2014/main" id="{354CE78D-A473-C761-AFD1-F08EA50BA203}"/>
+          <p:cNvPr id="247" name="Google Shape;541;p35">
+            <a:extLst>
+              <a:ext uri="{FF2B5EF4-FFF2-40B4-BE49-F238E27FC236}">
+                <a16:creationId xmlns:a16="http://schemas.microsoft.com/office/drawing/2014/main" id="{71814589-E129-0512-9ABF-F4D64144E70A}"/>
               </a:ext>
             </a:extLst>
           </p:cNvPr>
@@ -7112,8 +7116,8 @@
         </p:blipFill>
         <p:spPr>
           <a:xfrm>
-            <a:off x="27415224" y="12238443"/>
-            <a:ext cx="275053" cy="209527"/>
+            <a:off x="27442131" y="13559099"/>
+            <a:ext cx="254125" cy="209527"/>
           </a:xfrm>
           <a:prstGeom prst="rect">
             <a:avLst/>
@@ -7126,10 +7130,10 @@
       </p:pic>
       <p:pic>
         <p:nvPicPr>
-          <p:cNvPr id="247" name="Google Shape;541;p35">
-            <a:extLst>
-              <a:ext uri="{FF2B5EF4-FFF2-40B4-BE49-F238E27FC236}">
-                <a16:creationId xmlns:a16="http://schemas.microsoft.com/office/drawing/2014/main" id="{71814589-E129-0512-9ABF-F4D64144E70A}"/>
+          <p:cNvPr id="248" name="Google Shape;542;p35">
+            <a:extLst>
+              <a:ext uri="{FF2B5EF4-FFF2-40B4-BE49-F238E27FC236}">
+                <a16:creationId xmlns:a16="http://schemas.microsoft.com/office/drawing/2014/main" id="{A9ED35A6-6E9A-7B1E-4BCB-ADE7682F65AE}"/>
               </a:ext>
             </a:extLst>
           </p:cNvPr>
@@ -7146,8 +7150,8 @@
         </p:blipFill>
         <p:spPr>
           <a:xfrm>
-            <a:off x="27442131" y="13559099"/>
-            <a:ext cx="254125" cy="209527"/>
+            <a:off x="28627949" y="13859211"/>
+            <a:ext cx="281033" cy="209527"/>
           </a:xfrm>
           <a:prstGeom prst="rect">
             <a:avLst/>
@@ -7160,10 +7164,10 @@
       </p:pic>
       <p:pic>
         <p:nvPicPr>
-          <p:cNvPr id="248" name="Google Shape;542;p35">
-            <a:extLst>
-              <a:ext uri="{FF2B5EF4-FFF2-40B4-BE49-F238E27FC236}">
-                <a16:creationId xmlns:a16="http://schemas.microsoft.com/office/drawing/2014/main" id="{A9ED35A6-6E9A-7B1E-4BCB-ADE7682F65AE}"/>
+          <p:cNvPr id="249" name="Google Shape;537;p35">
+            <a:extLst>
+              <a:ext uri="{FF2B5EF4-FFF2-40B4-BE49-F238E27FC236}">
+                <a16:creationId xmlns:a16="http://schemas.microsoft.com/office/drawing/2014/main" id="{A089B3A0-B4A5-89F9-49F0-13937D0391DA}"/>
               </a:ext>
             </a:extLst>
           </p:cNvPr>
@@ -7171,7 +7175,7 @@
           <p:nvPr/>
         </p:nvPicPr>
         <p:blipFill>
-          <a:blip r:embed="rId22">
+          <a:blip r:embed="rId18">
             <a:alphaModFix/>
           </a:blip>
           <a:stretch>
@@ -7180,8 +7184,8 @@
         </p:blipFill>
         <p:spPr>
           <a:xfrm>
-            <a:off x="28627949" y="13859211"/>
-            <a:ext cx="281033" cy="209527"/>
+            <a:off x="23600474" y="12868795"/>
+            <a:ext cx="248146" cy="209527"/>
           </a:xfrm>
           <a:prstGeom prst="rect">
             <a:avLst/>
@@ -7194,10 +7198,10 @@
       </p:pic>
       <p:pic>
         <p:nvPicPr>
-          <p:cNvPr id="249" name="Google Shape;537;p35">
-            <a:extLst>
-              <a:ext uri="{FF2B5EF4-FFF2-40B4-BE49-F238E27FC236}">
-                <a16:creationId xmlns:a16="http://schemas.microsoft.com/office/drawing/2014/main" id="{A089B3A0-B4A5-89F9-49F0-13937D0391DA}"/>
+          <p:cNvPr id="250" name="Google Shape;538;p35">
+            <a:extLst>
+              <a:ext uri="{FF2B5EF4-FFF2-40B4-BE49-F238E27FC236}">
+                <a16:creationId xmlns:a16="http://schemas.microsoft.com/office/drawing/2014/main" id="{5B54AA36-28F0-1B95-FFE6-1E5301B01EF4}"/>
               </a:ext>
             </a:extLst>
           </p:cNvPr>
@@ -7214,8 +7218,8 @@
         </p:blipFill>
         <p:spPr>
           <a:xfrm>
-            <a:off x="23600474" y="12868795"/>
-            <a:ext cx="248146" cy="209527"/>
+            <a:off x="23584030" y="12255578"/>
+            <a:ext cx="275053" cy="209527"/>
           </a:xfrm>
           <a:prstGeom prst="rect">
             <a:avLst/>
@@ -7228,10 +7232,10 @@
       </p:pic>
       <p:pic>
         <p:nvPicPr>
-          <p:cNvPr id="250" name="Google Shape;538;p35">
-            <a:extLst>
-              <a:ext uri="{FF2B5EF4-FFF2-40B4-BE49-F238E27FC236}">
-                <a16:creationId xmlns:a16="http://schemas.microsoft.com/office/drawing/2014/main" id="{5B54AA36-28F0-1B95-FFE6-1E5301B01EF4}"/>
+          <p:cNvPr id="251" name="Google Shape;543;p35">
+            <a:extLst>
+              <a:ext uri="{FF2B5EF4-FFF2-40B4-BE49-F238E27FC236}">
+                <a16:creationId xmlns:a16="http://schemas.microsoft.com/office/drawing/2014/main" id="{40D72B35-7B66-F07A-D814-FDE302FC1D07}"/>
               </a:ext>
             </a:extLst>
           </p:cNvPr>
@@ -7240,40 +7244,6 @@
         </p:nvPicPr>
         <p:blipFill>
           <a:blip r:embed="rId20">
-            <a:alphaModFix/>
-          </a:blip>
-          <a:stretch>
-            <a:fillRect/>
-          </a:stretch>
-        </p:blipFill>
-        <p:spPr>
-          <a:xfrm>
-            <a:off x="23584030" y="12255578"/>
-            <a:ext cx="275053" cy="209527"/>
-          </a:xfrm>
-          <a:prstGeom prst="rect">
-            <a:avLst/>
-          </a:prstGeom>
-          <a:noFill/>
-          <a:ln>
-            <a:noFill/>
-          </a:ln>
-        </p:spPr>
-      </p:pic>
-      <p:pic>
-        <p:nvPicPr>
-          <p:cNvPr id="251" name="Google Shape;543;p35">
-            <a:extLst>
-              <a:ext uri="{FF2B5EF4-FFF2-40B4-BE49-F238E27FC236}">
-                <a16:creationId xmlns:a16="http://schemas.microsoft.com/office/drawing/2014/main" id="{40D72B35-7B66-F07A-D814-FDE302FC1D07}"/>
-              </a:ext>
-            </a:extLst>
-          </p:cNvPr>
-          <p:cNvPicPr preferRelativeResize="0"/>
-          <p:nvPr/>
-        </p:nvPicPr>
-        <p:blipFill>
-          <a:blip r:embed="rId21">
             <a:alphaModFix/>
           </a:blip>
           <a:stretch>
@@ -7601,7 +7571,7 @@
           <p:nvPr/>
         </p:nvPicPr>
         <p:blipFill rotWithShape="1">
-          <a:blip r:embed="rId24"/>
+          <a:blip r:embed="rId23"/>
           <a:srcRect l="14167" t="6139" r="13129" b="16146"/>
           <a:stretch/>
         </p:blipFill>
@@ -7630,7 +7600,7 @@
           <p:nvPr/>
         </p:nvPicPr>
         <p:blipFill rotWithShape="1">
-          <a:blip r:embed="rId25"/>
+          <a:blip r:embed="rId24"/>
           <a:srcRect l="13787" t="5963" r="12924" b="14147"/>
           <a:stretch/>
         </p:blipFill>
@@ -7659,7 +7629,7 @@
           <p:nvPr/>
         </p:nvPicPr>
         <p:blipFill rotWithShape="1">
-          <a:blip r:embed="rId26"/>
+          <a:blip r:embed="rId25"/>
           <a:srcRect l="14100" t="6448" r="14545" b="14813"/>
           <a:stretch/>
         </p:blipFill>
@@ -7688,7 +7658,7 @@
           <p:nvPr/>
         </p:nvPicPr>
         <p:blipFill rotWithShape="1">
-          <a:blip r:embed="rId27"/>
+          <a:blip r:embed="rId26"/>
           <a:srcRect l="14091" t="5214" r="15433" b="14262"/>
           <a:stretch/>
         </p:blipFill>
@@ -7717,7 +7687,7 @@
           <p:nvPr/>
         </p:nvPicPr>
         <p:blipFill rotWithShape="1">
-          <a:blip r:embed="rId28"/>
+          <a:blip r:embed="rId27"/>
           <a:srcRect l="86889" r="579" b="14070"/>
           <a:stretch/>
         </p:blipFill>
@@ -7798,7 +7768,7 @@
           <p:nvPr/>
         </p:nvPicPr>
         <p:blipFill>
-          <a:blip r:embed="rId11"/>
+          <a:blip r:embed="rId10"/>
           <a:stretch>
             <a:fillRect/>
           </a:stretch>
@@ -7861,7 +7831,7 @@
           <p:nvPr/>
         </p:nvPicPr>
         <p:blipFill rotWithShape="1">
-          <a:blip r:embed="rId29"/>
+          <a:blip r:embed="rId28"/>
           <a:srcRect l="15660" t="6446" r="16212" b="14436"/>
           <a:stretch/>
         </p:blipFill>
@@ -7890,7 +7860,7 @@
           <p:nvPr/>
         </p:nvPicPr>
         <p:blipFill rotWithShape="1">
-          <a:blip r:embed="rId30"/>
+          <a:blip r:embed="rId29"/>
           <a:srcRect l="14766" t="6263" r="14198" b="14731"/>
           <a:stretch/>
         </p:blipFill>
@@ -7919,7 +7889,7 @@
           <p:nvPr/>
         </p:nvPicPr>
         <p:blipFill rotWithShape="1">
-          <a:blip r:embed="rId31"/>
+          <a:blip r:embed="rId30"/>
           <a:srcRect l="6563" t="16252" r="16718" b="16258"/>
           <a:stretch/>
         </p:blipFill>
@@ -7948,7 +7918,7 @@
           <p:nvPr/>
         </p:nvPicPr>
         <p:blipFill rotWithShape="1">
-          <a:blip r:embed="rId32"/>
+          <a:blip r:embed="rId31"/>
           <a:srcRect l="6562" t="16023" r="15805" b="15764"/>
           <a:stretch/>
         </p:blipFill>
@@ -8052,7 +8022,7 @@
           <p:nvPr/>
         </p:nvPicPr>
         <p:blipFill>
-          <a:blip r:embed="rId33"/>
+          <a:blip r:embed="rId32"/>
           <a:stretch>
             <a:fillRect/>
           </a:stretch>
@@ -8082,7 +8052,7 @@
           <p:nvPr/>
         </p:nvPicPr>
         <p:blipFill rotWithShape="1">
-          <a:blip r:embed="rId28"/>
+          <a:blip r:embed="rId27"/>
           <a:srcRect l="13601" t="5668" r="13484" b="14334"/>
           <a:stretch/>
         </p:blipFill>
@@ -8111,7 +8081,7 @@
           <p:nvPr/>
         </p:nvPicPr>
         <p:blipFill rotWithShape="1">
-          <a:blip r:embed="rId34"/>
+          <a:blip r:embed="rId33"/>
           <a:srcRect l="6562" t="16252" r="15670" b="15764"/>
           <a:stretch/>
         </p:blipFill>
@@ -8140,7 +8110,7 @@
           <p:nvPr/>
         </p:nvPicPr>
         <p:blipFill rotWithShape="1">
-          <a:blip r:embed="rId35"/>
+          <a:blip r:embed="rId34"/>
           <a:srcRect l="6562" t="16435" r="15670" b="15567"/>
           <a:stretch/>
         </p:blipFill>
@@ -8169,7 +8139,7 @@
           <p:nvPr/>
         </p:nvPicPr>
         <p:blipFill rotWithShape="1">
-          <a:blip r:embed="rId36"/>
+          <a:blip r:embed="rId35"/>
           <a:srcRect l="5821" t="15420" r="15206" b="15042"/>
           <a:stretch/>
         </p:blipFill>
@@ -8198,7 +8168,7 @@
           <p:nvPr/>
         </p:nvPicPr>
         <p:blipFill rotWithShape="1">
-          <a:blip r:embed="rId37"/>
+          <a:blip r:embed="rId36"/>
           <a:srcRect l="6563" t="16435" r="16640" b="15985"/>
           <a:stretch/>
         </p:blipFill>
@@ -8227,7 +8197,7 @@
           <p:nvPr/>
         </p:nvPicPr>
         <p:blipFill rotWithShape="1">
-          <a:blip r:embed="rId38"/>
+          <a:blip r:embed="rId37"/>
           <a:srcRect l="6562" t="15530" r="16227" b="15373"/>
           <a:stretch/>
         </p:blipFill>
@@ -8256,7 +8226,7 @@
           <p:nvPr/>
         </p:nvPicPr>
         <p:blipFill rotWithShape="1">
-          <a:blip r:embed="rId39"/>
+          <a:blip r:embed="rId38"/>
           <a:srcRect l="6562" t="16667" r="16762" b="15041"/>
           <a:stretch/>
         </p:blipFill>
@@ -8477,6 +8447,36 @@
           <p:nvPr/>
         </p:nvPicPr>
         <p:blipFill>
+          <a:blip r:embed="rId39"/>
+          <a:stretch>
+            <a:fillRect/>
+          </a:stretch>
+        </p:blipFill>
+        <p:spPr>
+          <a:xfrm>
+            <a:off x="15770811" y="7014686"/>
+            <a:ext cx="1383304" cy="923295"/>
+          </a:xfrm>
+          <a:prstGeom prst="rect">
+            <a:avLst/>
+          </a:prstGeom>
+        </p:spPr>
+      </p:pic>
+      <p:pic>
+        <p:nvPicPr>
+          <p:cNvPr id="355" name="Picture 354" descr="A qr code with a cat&#10;&#10;Description automatically generated">
+            <a:extLst>
+              <a:ext uri="{FF2B5EF4-FFF2-40B4-BE49-F238E27FC236}">
+                <a16:creationId xmlns:a16="http://schemas.microsoft.com/office/drawing/2014/main" id="{09CC06D3-3276-C10A-A867-5BC6E7207BEF}"/>
+              </a:ext>
+            </a:extLst>
+          </p:cNvPr>
+          <p:cNvPicPr>
+            <a:picLocks noChangeAspect="1"/>
+          </p:cNvPicPr>
+          <p:nvPr/>
+        </p:nvPicPr>
+        <p:blipFill>
           <a:blip r:embed="rId40"/>
           <a:stretch>
             <a:fillRect/>
@@ -8484,8 +8484,8 @@
         </p:blipFill>
         <p:spPr>
           <a:xfrm>
-            <a:off x="15770811" y="7014686"/>
-            <a:ext cx="1383304" cy="923295"/>
+            <a:off x="329375" y="3717360"/>
+            <a:ext cx="1938528" cy="1938528"/>
           </a:xfrm>
           <a:prstGeom prst="rect">
             <a:avLst/>

</xml_diff>

<commit_message>
moved versions to other folder; tracking 'JDH_poster_draft' - the latest version of the powerpoint
</commit_message>
<xml_diff>
--- a/JDH_poster_spacing_rearrangefig4.pptx
+++ b/JDH_poster_spacing_rearrangefig4.pptx
@@ -3983,7 +3983,7 @@
         </p:nvSpPr>
         <p:spPr>
           <a:xfrm>
-            <a:off x="15832713" y="32082114"/>
+            <a:off x="15871711" y="31083976"/>
             <a:ext cx="15087600" cy="830997"/>
           </a:xfrm>
           <a:prstGeom prst="rect">
@@ -4039,8 +4039,8 @@
         </p:nvSpPr>
         <p:spPr>
           <a:xfrm>
-            <a:off x="15832713" y="32945758"/>
-            <a:ext cx="15087600" cy="1569660"/>
+            <a:off x="15871711" y="31947620"/>
+            <a:ext cx="15087600" cy="2677656"/>
           </a:xfrm>
           <a:prstGeom prst="rect">
             <a:avLst/>
@@ -4055,13 +4055,13 @@
           <a:p>
             <a:pPr algn="just"/>
             <a:r>
-              <a:rPr lang="en-US" sz="2400" dirty="0">
+              <a:rPr lang="en-US" sz="2800" dirty="0">
                 <a:latin typeface="Avenir Book" panose="02000503020000020003" pitchFamily="2" charset="0"/>
               </a:rPr>
               <a:t>[1] </a:t>
             </a:r>
             <a:r>
-              <a:rPr lang="en-US" sz="2400" b="0" i="0" dirty="0">
+              <a:rPr lang="en-US" sz="2800" b="0" i="0" dirty="0">
                 <a:solidFill>
                   <a:srgbClr val="222222"/>
                 </a:solidFill>
@@ -4071,7 +4071,7 @@
               <a:t>Basso, Jonelle, et al., Buchan, Alison. "Genetically similar temperate phages form coalitions with their shared host that lead to niche-specific fitness effects." </a:t>
             </a:r>
             <a:r>
-              <a:rPr lang="en-US" sz="2400" b="0" i="1" dirty="0">
+              <a:rPr lang="en-US" sz="2800" b="0" i="1" dirty="0">
                 <a:solidFill>
                   <a:srgbClr val="222222"/>
                 </a:solidFill>
@@ -4081,7 +4081,7 @@
               <a:t>The ISME journal</a:t>
             </a:r>
             <a:r>
-              <a:rPr lang="en-US" sz="2400" b="0" i="0" dirty="0">
+              <a:rPr lang="en-US" sz="2800" b="0" i="0" dirty="0">
                 <a:solidFill>
                   <a:srgbClr val="222222"/>
                 </a:solidFill>
@@ -4094,13 +4094,13 @@
           <a:p>
             <a:pPr algn="just"/>
             <a:r>
-              <a:rPr lang="en-US" sz="2400" dirty="0">
+              <a:rPr lang="en-US" sz="2800" dirty="0">
                 <a:latin typeface="Avenir Book" panose="02000503020000020003" pitchFamily="2" charset="0"/>
               </a:rPr>
               <a:t>[2] </a:t>
             </a:r>
             <a:r>
-              <a:rPr lang="en-US" sz="2400" b="0" i="0" dirty="0">
+              <a:rPr lang="en-US" sz="2800" b="0" i="0" dirty="0">
                 <a:solidFill>
                   <a:srgbClr val="222222"/>
                 </a:solidFill>
@@ -4110,7 +4110,7 @@
               <a:t>Harrison, Ellie, and Michael A. </a:t>
             </a:r>
             <a:r>
-              <a:rPr lang="en-US" sz="2400" b="0" i="0" dirty="0" err="1">
+              <a:rPr lang="en-US" sz="2800" b="0" i="0" dirty="0" err="1">
                 <a:solidFill>
                   <a:srgbClr val="222222"/>
                 </a:solidFill>
@@ -4120,7 +4120,7 @@
               <a:t>Brockhurst</a:t>
             </a:r>
             <a:r>
-              <a:rPr lang="en-US" sz="2400" b="0" i="0" dirty="0">
+              <a:rPr lang="en-US" sz="2800" b="0" i="0" dirty="0">
                 <a:solidFill>
                   <a:srgbClr val="222222"/>
                 </a:solidFill>
@@ -4130,7 +4130,7 @@
               <a:t>. "Ecological and evolutionary benefits of temperate phage: what does or doesn't kill you makes you stronger." </a:t>
             </a:r>
             <a:r>
-              <a:rPr lang="en-US" sz="2400" b="0" i="1" dirty="0" err="1">
+              <a:rPr lang="en-US" sz="2800" b="0" i="1" dirty="0" err="1">
                 <a:solidFill>
                   <a:srgbClr val="222222"/>
                 </a:solidFill>
@@ -4140,7 +4140,7 @@
               <a:t>BioEssays</a:t>
             </a:r>
             <a:r>
-              <a:rPr lang="en-US" sz="2400" b="0" i="0" dirty="0">
+              <a:rPr lang="en-US" sz="2800" b="0" i="0" dirty="0">
                 <a:solidFill>
                   <a:srgbClr val="222222"/>
                 </a:solidFill>
@@ -4226,8 +4226,8 @@
         </p:nvSpPr>
         <p:spPr>
           <a:xfrm>
-            <a:off x="15732272" y="28264696"/>
-            <a:ext cx="12913045" cy="1754326"/>
+            <a:off x="15771270" y="28103814"/>
+            <a:ext cx="12913045" cy="1384995"/>
           </a:xfrm>
           <a:prstGeom prst="rect">
             <a:avLst/>
@@ -4241,7 +4241,7 @@
           <a:lstStyle/>
           <a:p>
             <a:r>
-              <a:rPr lang="en-US" sz="3600" b="1" dirty="0">
+              <a:rPr lang="en-US" sz="2800" b="1" dirty="0">
                 <a:latin typeface="Avenir Book" panose="02000503020000020003" pitchFamily="2" charset="0"/>
               </a:rPr>
               <a:t>Phages act in cahoots with hosts in competition:</a:t>
@@ -4253,7 +4253,7 @@
               <a:buAutoNum type="arabicPeriod"/>
             </a:pPr>
             <a:r>
-              <a:rPr lang="en-US" sz="3600" dirty="0">
+              <a:rPr lang="en-US" sz="2800" dirty="0">
                 <a:latin typeface="Avenir Book" panose="02000503020000020003" pitchFamily="2" charset="0"/>
               </a:rPr>
               <a:t> a “buffer” against invasion </a:t>
@@ -4265,7 +4265,7 @@
               <a:buAutoNum type="arabicPeriod"/>
             </a:pPr>
             <a:r>
-              <a:rPr lang="en-US" sz="3600" dirty="0">
+              <a:rPr lang="en-US" sz="2800" dirty="0">
                 <a:latin typeface="Avenir Book" panose="02000503020000020003" pitchFamily="2" charset="0"/>
               </a:rPr>
               <a:t> “weapons” to deploy during invasion</a:t>
@@ -4287,8 +4287,8 @@
         </p:nvSpPr>
         <p:spPr>
           <a:xfrm>
-            <a:off x="2271147" y="3762375"/>
-            <a:ext cx="6904441" cy="2390911"/>
+            <a:off x="2199603" y="4632473"/>
+            <a:ext cx="6904441" cy="1005916"/>
           </a:xfrm>
           <a:prstGeom prst="rect">
             <a:avLst/>
@@ -4370,69 +4370,6 @@
               </a:rPr>
               <a:t>/</a:t>
             </a:r>
-          </a:p>
-          <a:p>
-            <a:pPr>
-              <a:lnSpc>
-                <a:spcPts val="3600"/>
-              </a:lnSpc>
-            </a:pPr>
-            <a:r>
-              <a:rPr lang="en-US" sz="2800" b="1" dirty="0">
-                <a:latin typeface="Avenir Book" panose="02000503020000020003" pitchFamily="2" charset="0"/>
-              </a:rPr>
-              <a:t>project repository: </a:t>
-            </a:r>
-            <a:r>
-              <a:rPr lang="en-US" sz="2800" dirty="0">
-                <a:latin typeface="Avenir Book" panose="02000503020000020003" pitchFamily="2" charset="0"/>
-              </a:rPr>
-              <a:t>https://</a:t>
-            </a:r>
-            <a:r>
-              <a:rPr lang="en-US" sz="2800" dirty="0" err="1">
-                <a:latin typeface="Avenir Book" panose="02000503020000020003" pitchFamily="2" charset="0"/>
-              </a:rPr>
-              <a:t>github.com</a:t>
-            </a:r>
-            <a:r>
-              <a:rPr lang="en-US" sz="2800" dirty="0">
-                <a:latin typeface="Avenir Book" panose="02000503020000020003" pitchFamily="2" charset="0"/>
-              </a:rPr>
-              <a:t>/</a:t>
-            </a:r>
-          </a:p>
-          <a:p>
-            <a:pPr>
-              <a:lnSpc>
-                <a:spcPts val="3600"/>
-              </a:lnSpc>
-            </a:pPr>
-            <a:r>
-              <a:rPr lang="en-US" sz="2800" dirty="0">
-                <a:latin typeface="Avenir Book" panose="02000503020000020003" pitchFamily="2" charset="0"/>
-              </a:rPr>
-              <a:t>Jeremy-D-Harris/</a:t>
-            </a:r>
-            <a:r>
-              <a:rPr lang="en-US" sz="2800" dirty="0" err="1">
-                <a:latin typeface="Avenir Book" panose="02000503020000020003" pitchFamily="2" charset="0"/>
-              </a:rPr>
-              <a:t>coalitions_working</a:t>
-            </a:r>
-            <a:endParaRPr lang="en-US" sz="2800" dirty="0">
-              <a:latin typeface="Avenir Book" panose="02000503020000020003" pitchFamily="2" charset="0"/>
-            </a:endParaRPr>
-          </a:p>
-          <a:p>
-            <a:pPr>
-              <a:lnSpc>
-                <a:spcPts val="3600"/>
-              </a:lnSpc>
-            </a:pPr>
-            <a:endParaRPr lang="en-US" sz="2800" dirty="0">
-              <a:latin typeface="Avenir Book" panose="02000503020000020003" pitchFamily="2" charset="0"/>
-            </a:endParaRPr>
           </a:p>
         </p:txBody>
       </p:sp>
@@ -4669,8 +4606,8 @@
         </p:nvSpPr>
         <p:spPr>
           <a:xfrm>
-            <a:off x="15812962" y="30046405"/>
-            <a:ext cx="12913045" cy="1754326"/>
+            <a:off x="15886993" y="29485166"/>
+            <a:ext cx="12913045" cy="1384995"/>
           </a:xfrm>
           <a:prstGeom prst="rect">
             <a:avLst/>
@@ -4684,7 +4621,7 @@
           <a:lstStyle/>
           <a:p>
             <a:r>
-              <a:rPr lang="en-US" sz="3600" b="1" dirty="0">
+              <a:rPr lang="en-US" sz="2800" b="1" dirty="0">
                 <a:latin typeface="Avenir Book" panose="02000503020000020003" pitchFamily="2" charset="0"/>
               </a:rPr>
               <a:t>Future Directions:</a:t>
@@ -4696,7 +4633,7 @@
               <a:buAutoNum type="arabicPeriod"/>
             </a:pPr>
             <a:r>
-              <a:rPr lang="en-US" sz="3600" dirty="0">
+              <a:rPr lang="en-US" sz="2800" dirty="0">
                 <a:latin typeface="Avenir Book" panose="02000503020000020003" pitchFamily="2" charset="0"/>
               </a:rPr>
               <a:t> Steady-state analysis for coexistence</a:t>
@@ -4708,7 +4645,7 @@
               <a:buAutoNum type="arabicPeriod"/>
             </a:pPr>
             <a:r>
-              <a:rPr lang="en-US" sz="3600" dirty="0">
+              <a:rPr lang="en-US" sz="2800" dirty="0">
                 <a:latin typeface="Avenir Book" panose="02000503020000020003" pitchFamily="2" charset="0"/>
               </a:rPr>
               <a:t> Phase separation and an emergence of a length scale</a:t>
@@ -5388,8 +5325,8 @@
         </p:blipFill>
         <p:spPr>
           <a:xfrm>
-            <a:off x="17233190" y="11894630"/>
-            <a:ext cx="4893153" cy="3386371"/>
+            <a:off x="17654190" y="12120892"/>
+            <a:ext cx="3977639" cy="3054096"/>
           </a:xfrm>
           <a:prstGeom prst="rect">
             <a:avLst/>
@@ -5418,13 +5355,13 @@
           <a:blip r:embed="rId14">
             <a:alphaModFix/>
           </a:blip>
-          <a:srcRect b="51905"/>
+          <a:srcRect l="3373" t="5549" r="8373" b="54208"/>
           <a:stretch/>
         </p:blipFill>
         <p:spPr>
           <a:xfrm>
-            <a:off x="26570361" y="11546367"/>
-            <a:ext cx="4486440" cy="3489763"/>
+            <a:off x="26739266" y="12028481"/>
+            <a:ext cx="3959455" cy="3116531"/>
           </a:xfrm>
           <a:prstGeom prst="rect">
             <a:avLst/>
@@ -5738,20 +5675,21 @@
           </p:cNvPr>
           <p:cNvCxnSpPr>
             <a:cxnSpLocks/>
-            <a:endCxn id="168" idx="4"/>
+            <a:stCxn id="167" idx="0"/>
+            <a:endCxn id="369" idx="4"/>
           </p:cNvCxnSpPr>
           <p:nvPr/>
         </p:nvCxnSpPr>
         <p:spPr>
-          <a:xfrm flipH="1" flipV="1">
-            <a:off x="18412584" y="9103878"/>
-            <a:ext cx="2011954" cy="19034"/>
+          <a:xfrm flipH="1">
+            <a:off x="18176317" y="9026293"/>
+            <a:ext cx="2315906" cy="0"/>
           </a:xfrm>
           <a:prstGeom prst="straightConnector1">
             <a:avLst/>
           </a:prstGeom>
           <a:noFill/>
-          <a:ln w="25400" cap="flat" cmpd="sng">
+          <a:ln w="38100" cap="flat" cmpd="sng">
             <a:solidFill>
               <a:srgbClr val="666666"/>
             </a:solidFill>
@@ -5778,62 +5716,14 @@
         </p:nvSpPr>
         <p:spPr>
           <a:xfrm rot="16200000">
-            <a:off x="20397436" y="9064621"/>
-            <a:ext cx="125716" cy="116598"/>
+            <a:off x="20485787" y="8943997"/>
+            <a:ext cx="177463" cy="164592"/>
           </a:xfrm>
           <a:prstGeom prst="ellipse">
             <a:avLst/>
           </a:prstGeom>
           <a:solidFill>
             <a:srgbClr val="B3B3B3"/>
-          </a:solidFill>
-          <a:ln>
-            <a:noFill/>
-          </a:ln>
-        </p:spPr>
-        <p:txBody>
-          <a:bodyPr spcFirstLastPara="1" wrap="square" lIns="91425" tIns="91425" rIns="91425" bIns="91425" anchor="ctr" anchorCtr="0">
-            <a:noAutofit/>
-          </a:bodyPr>
-          <a:lstStyle/>
-          <a:p>
-            <a:pPr marL="0" lvl="0" indent="0" algn="l" rtl="0">
-              <a:spcBef>
-                <a:spcPts val="0"/>
-              </a:spcBef>
-              <a:spcAft>
-                <a:spcPts val="0"/>
-              </a:spcAft>
-              <a:buNone/>
-            </a:pPr>
-            <a:endParaRPr/>
-          </a:p>
-        </p:txBody>
-      </p:sp>
-      <p:sp>
-        <p:nvSpPr>
-          <p:cNvPr id="168" name="Google Shape;598;p36">
-            <a:extLst>
-              <a:ext uri="{FF2B5EF4-FFF2-40B4-BE49-F238E27FC236}">
-                <a16:creationId xmlns:a16="http://schemas.microsoft.com/office/drawing/2014/main" id="{7357ED24-50E4-4F5A-33BF-E0B38F0E0226}"/>
-              </a:ext>
-            </a:extLst>
-          </p:cNvPr>
-          <p:cNvSpPr>
-            <a:spLocks noChangeAspect="1"/>
-          </p:cNvSpPr>
-          <p:nvPr/>
-        </p:nvSpPr>
-        <p:spPr>
-          <a:xfrm rot="16200000">
-            <a:off x="18291427" y="9045579"/>
-            <a:ext cx="125716" cy="116598"/>
-          </a:xfrm>
-          <a:prstGeom prst="ellipse">
-            <a:avLst/>
-          </a:prstGeom>
-          <a:solidFill>
-            <a:srgbClr val="4D84C1"/>
           </a:solidFill>
           <a:ln>
             <a:noFill/>
@@ -5881,7 +5771,7 @@
         </p:blipFill>
         <p:spPr>
           <a:xfrm>
-            <a:off x="22924427" y="7695038"/>
+            <a:off x="22838279" y="7708808"/>
             <a:ext cx="3797246" cy="3069941"/>
           </a:xfrm>
           <a:prstGeom prst="rect">
@@ -5916,7 +5806,7 @@
         </p:blipFill>
         <p:spPr>
           <a:xfrm>
-            <a:off x="26838861" y="7688647"/>
+            <a:off x="26758948" y="7702946"/>
             <a:ext cx="3844074" cy="3076331"/>
           </a:xfrm>
           <a:prstGeom prst="rect">
@@ -6190,7 +6080,7 @@
         </p:blipFill>
         <p:spPr>
           <a:xfrm>
-            <a:off x="19350866" y="8099320"/>
+            <a:off x="19356619" y="8097640"/>
             <a:ext cx="680046" cy="230480"/>
           </a:xfrm>
           <a:prstGeom prst="rect">
@@ -6226,7 +6116,7 @@
         </p:blipFill>
         <p:spPr>
           <a:xfrm>
-            <a:off x="20691170" y="9501502"/>
+            <a:off x="20674418" y="9469304"/>
             <a:ext cx="304951" cy="251433"/>
           </a:xfrm>
           <a:prstGeom prst="rect">
@@ -6254,8 +6144,8 @@
         </p:nvCxnSpPr>
         <p:spPr>
           <a:xfrm>
-            <a:off x="18477584" y="12063454"/>
-            <a:ext cx="0" cy="2805540"/>
+            <a:off x="18644354" y="12270010"/>
+            <a:ext cx="0" cy="2633472"/>
           </a:xfrm>
           <a:prstGeom prst="straightConnector1">
             <a:avLst/>
@@ -6288,8 +6178,8 @@
         </p:nvCxnSpPr>
         <p:spPr>
           <a:xfrm>
-            <a:off x="19343776" y="12063454"/>
-            <a:ext cx="0" cy="2805540"/>
+            <a:off x="19356619" y="12276626"/>
+            <a:ext cx="0" cy="2633472"/>
           </a:xfrm>
           <a:prstGeom prst="straightConnector1">
             <a:avLst/>
@@ -6388,7 +6278,7 @@
         </p:nvSpPr>
         <p:spPr>
           <a:xfrm>
-            <a:off x="16768681" y="15232825"/>
+            <a:off x="16415794" y="14958369"/>
             <a:ext cx="6561696" cy="738633"/>
           </a:xfrm>
           <a:prstGeom prst="rect">
@@ -6419,7 +6309,7 @@
                 <a:latin typeface="Times New Roman" panose="02020603050405020304" pitchFamily="18" charset="0"/>
                 <a:cs typeface="Times New Roman" panose="02020603050405020304" pitchFamily="18" charset="0"/>
               </a:rPr>
-              <a:t>Lag Time Introduction of </a:t>
+              <a:t>Lag Time to Introduce </a:t>
             </a:r>
             <a:r>
               <a:rPr lang="en" sz="3600" b="1" i="1" dirty="0">
@@ -6548,7 +6438,7 @@
         </p:nvSpPr>
         <p:spPr>
           <a:xfrm rot="16200000">
-            <a:off x="12425058" y="11266889"/>
+            <a:off x="12488202" y="11118719"/>
             <a:ext cx="8234708" cy="738633"/>
           </a:xfrm>
           <a:prstGeom prst="rect">
@@ -6632,7 +6522,7 @@
         </p:blipFill>
         <p:spPr>
           <a:xfrm>
-            <a:off x="22836593" y="11907935"/>
+            <a:off x="22874602" y="12075072"/>
             <a:ext cx="3797246" cy="3069941"/>
           </a:xfrm>
           <a:prstGeom prst="rect">
@@ -6658,7 +6548,7 @@
         </p:nvSpPr>
         <p:spPr>
           <a:xfrm rot="16200000">
-            <a:off x="19684867" y="13149789"/>
+            <a:off x="19598555" y="12907627"/>
             <a:ext cx="5813460" cy="738633"/>
           </a:xfrm>
           <a:prstGeom prst="rect">
@@ -6712,7 +6602,7 @@
         </p:nvSpPr>
         <p:spPr>
           <a:xfrm>
-            <a:off x="24040627" y="14868994"/>
+            <a:off x="23936179" y="14956940"/>
             <a:ext cx="1899457" cy="738633"/>
           </a:xfrm>
           <a:prstGeom prst="rect">
@@ -6773,7 +6663,7 @@
         </p:nvSpPr>
         <p:spPr>
           <a:xfrm rot="16200000">
-            <a:off x="19489659" y="8501349"/>
+            <a:off x="19638364" y="8459027"/>
             <a:ext cx="5813460" cy="738633"/>
           </a:xfrm>
           <a:prstGeom prst="rect">
@@ -6827,7 +6717,7 @@
         </p:nvSpPr>
         <p:spPr>
           <a:xfrm>
-            <a:off x="27990862" y="14750311"/>
+            <a:off x="27920155" y="14910098"/>
             <a:ext cx="1938855" cy="738633"/>
           </a:xfrm>
           <a:prstGeom prst="rect">
@@ -6918,7 +6808,7 @@
         </p:nvSpPr>
         <p:spPr>
           <a:xfrm>
-            <a:off x="24116807" y="10632272"/>
+            <a:off x="23587611" y="10646304"/>
             <a:ext cx="2243242" cy="738633"/>
           </a:xfrm>
           <a:prstGeom prst="rect">
@@ -6979,7 +6869,7 @@
         </p:nvSpPr>
         <p:spPr>
           <a:xfrm>
-            <a:off x="28069849" y="10628045"/>
+            <a:off x="27767962" y="10629364"/>
             <a:ext cx="2243242" cy="738633"/>
           </a:xfrm>
           <a:prstGeom prst="rect">
@@ -7048,7 +6938,7 @@
         </p:blipFill>
         <p:spPr>
           <a:xfrm>
-            <a:off x="27442131" y="12826116"/>
+            <a:off x="27480140" y="12993253"/>
             <a:ext cx="248146" cy="209527"/>
           </a:xfrm>
           <a:prstGeom prst="rect">
@@ -7082,7 +6972,7 @@
         </p:blipFill>
         <p:spPr>
           <a:xfrm>
-            <a:off x="27415224" y="12238443"/>
+            <a:off x="27453233" y="12405580"/>
             <a:ext cx="275053" cy="209527"/>
           </a:xfrm>
           <a:prstGeom prst="rect">
@@ -7116,7 +7006,7 @@
         </p:blipFill>
         <p:spPr>
           <a:xfrm>
-            <a:off x="27442131" y="13559099"/>
+            <a:off x="27480140" y="13726236"/>
             <a:ext cx="254125" cy="209527"/>
           </a:xfrm>
           <a:prstGeom prst="rect">
@@ -7150,7 +7040,7 @@
         </p:blipFill>
         <p:spPr>
           <a:xfrm>
-            <a:off x="28627949" y="13859211"/>
+            <a:off x="28665958" y="14026348"/>
             <a:ext cx="281033" cy="209527"/>
           </a:xfrm>
           <a:prstGeom prst="rect">
@@ -7184,7 +7074,7 @@
         </p:blipFill>
         <p:spPr>
           <a:xfrm>
-            <a:off x="23600474" y="12868795"/>
+            <a:off x="23638483" y="13035932"/>
             <a:ext cx="248146" cy="209527"/>
           </a:xfrm>
           <a:prstGeom prst="rect">
@@ -7218,7 +7108,7 @@
         </p:blipFill>
         <p:spPr>
           <a:xfrm>
-            <a:off x="23584030" y="12255578"/>
+            <a:off x="23622039" y="12422715"/>
             <a:ext cx="275053" cy="209527"/>
           </a:xfrm>
           <a:prstGeom prst="rect">
@@ -7252,7 +7142,7 @@
         </p:blipFill>
         <p:spPr>
           <a:xfrm>
-            <a:off x="23594495" y="13428016"/>
+            <a:off x="23632504" y="13595153"/>
             <a:ext cx="254125" cy="209527"/>
           </a:xfrm>
           <a:prstGeom prst="rect">
@@ -7278,7 +7168,7 @@
         </p:nvSpPr>
         <p:spPr>
           <a:xfrm>
-            <a:off x="15981499" y="24895081"/>
+            <a:off x="15975721" y="25087392"/>
             <a:ext cx="14994283" cy="1815882"/>
           </a:xfrm>
           <a:prstGeom prst="rect">
@@ -7303,7 +7193,25 @@
               <a:rPr lang="en-US" sz="2800" dirty="0">
                 <a:latin typeface="Avenir Book" panose="02000503020000020003" pitchFamily="2" charset="0"/>
               </a:rPr>
-              <a:t>Invasion dynamics in a 2D grid (6 mm x 6 mm) shown at: 0, 24, 72, 120, 200 hours. With LA induction </a:t>
+              <a:t>Invasion dynamics in a 2D grid (6 mm x 6 mm) shown at: 0, 24, 72, 120, 200 hours. With </a:t>
+            </a:r>
+            <a:r>
+              <a:rPr lang="en-US" sz="2800" i="1" dirty="0">
+                <a:latin typeface="Avenir Book" panose="02000503020000020003" pitchFamily="2" charset="0"/>
+              </a:rPr>
+              <a:t>L</a:t>
+            </a:r>
+            <a:r>
+              <a:rPr lang="en-US" sz="2800" i="1" baseline="-25000" dirty="0">
+                <a:latin typeface="Avenir Book" panose="02000503020000020003" pitchFamily="2" charset="0"/>
+              </a:rPr>
+              <a:t>A</a:t>
+            </a:r>
+            <a:r>
+              <a:rPr lang="en-US" sz="2800" dirty="0">
+                <a:latin typeface="Avenir Book" panose="02000503020000020003" pitchFamily="2" charset="0"/>
+              </a:rPr>
+              <a:t> induction </a:t>
             </a:r>
             <a:r>
               <a:rPr lang="en-US" sz="2800" b="1" dirty="0">
@@ -7315,7 +7223,37 @@
               <a:rPr lang="en-US" sz="2800" dirty="0">
                 <a:latin typeface="Avenir Book" panose="02000503020000020003" pitchFamily="2" charset="0"/>
               </a:rPr>
-              <a:t>, LB colony expansion is inhibited compared to without LA induction </a:t>
+              <a:t>, </a:t>
+            </a:r>
+            <a:r>
+              <a:rPr lang="en-US" sz="2800" i="1" dirty="0">
+                <a:latin typeface="Avenir Book" panose="02000503020000020003" pitchFamily="2" charset="0"/>
+              </a:rPr>
+              <a:t>LB</a:t>
+            </a:r>
+            <a:r>
+              <a:rPr lang="en-US" sz="2800" dirty="0">
+                <a:latin typeface="Avenir Book" panose="02000503020000020003" pitchFamily="2" charset="0"/>
+              </a:rPr>
+              <a:t> colony expansion is inhibited compared to without </a:t>
+            </a:r>
+            <a:r>
+              <a:rPr lang="en-US" sz="2800" i="1" dirty="0">
+                <a:latin typeface="Avenir Book" panose="02000503020000020003" pitchFamily="2" charset="0"/>
+              </a:rPr>
+              <a:t>L</a:t>
+            </a:r>
+            <a:r>
+              <a:rPr lang="en-US" sz="2800" i="1" baseline="-25000" dirty="0">
+                <a:latin typeface="Avenir Book" panose="02000503020000020003" pitchFamily="2" charset="0"/>
+              </a:rPr>
+              <a:t>A</a:t>
+            </a:r>
+            <a:r>
+              <a:rPr lang="en-US" sz="2800" dirty="0">
+                <a:latin typeface="Avenir Book" panose="02000503020000020003" pitchFamily="2" charset="0"/>
+              </a:rPr>
+              <a:t> induction </a:t>
             </a:r>
             <a:r>
               <a:rPr lang="en-US" sz="2800" b="1" dirty="0">
@@ -7327,7 +7265,25 @@
               <a:rPr lang="en-US" sz="2800" dirty="0">
                 <a:latin typeface="Avenir Book" panose="02000503020000020003" pitchFamily="2" charset="0"/>
               </a:rPr>
-              <a:t>. Invasion dynamics without LB induction </a:t>
+              <a:t>. Invasion dynamics without </a:t>
+            </a:r>
+            <a:r>
+              <a:rPr lang="en-US" sz="2800" i="1" dirty="0">
+                <a:latin typeface="Avenir Book" panose="02000503020000020003" pitchFamily="2" charset="0"/>
+              </a:rPr>
+              <a:t>L</a:t>
+            </a:r>
+            <a:r>
+              <a:rPr lang="en-US" sz="2800" i="1" baseline="-25000" dirty="0">
+                <a:latin typeface="Avenir Book" panose="02000503020000020003" pitchFamily="2" charset="0"/>
+              </a:rPr>
+              <a:t>B</a:t>
+            </a:r>
+            <a:r>
+              <a:rPr lang="en-US" sz="2800" dirty="0">
+                <a:latin typeface="Avenir Book" panose="02000503020000020003" pitchFamily="2" charset="0"/>
+              </a:rPr>
+              <a:t> induction </a:t>
             </a:r>
             <a:r>
               <a:rPr lang="en-US" sz="2800" b="1" dirty="0">
@@ -7361,8 +7317,8 @@
         </p:nvSpPr>
         <p:spPr>
           <a:xfrm>
-            <a:off x="16037681" y="21065420"/>
-            <a:ext cx="2686568" cy="615523"/>
+            <a:off x="15828264" y="21472732"/>
+            <a:ext cx="3495450" cy="738633"/>
           </a:xfrm>
           <a:prstGeom prst="rect">
             <a:avLst/>
@@ -7388,41 +7344,41 @@
               <a:buNone/>
             </a:pPr>
             <a:r>
-              <a:rPr lang="en" sz="2800" b="1" i="1" dirty="0">
+              <a:rPr lang="en" sz="3600" b="1" i="1" dirty="0">
                 <a:latin typeface="Times New Roman" panose="02020603050405020304" pitchFamily="18" charset="0"/>
                 <a:cs typeface="Times New Roman" panose="02020603050405020304" pitchFamily="18" charset="0"/>
               </a:rPr>
               <a:t>L</a:t>
             </a:r>
             <a:r>
-              <a:rPr lang="en" sz="2800" b="1" i="1" baseline="-25000" dirty="0">
+              <a:rPr lang="en" sz="3600" b="1" i="1" baseline="-25000" dirty="0">
                 <a:latin typeface="Times New Roman" panose="02020603050405020304" pitchFamily="18" charset="0"/>
                 <a:cs typeface="Times New Roman" panose="02020603050405020304" pitchFamily="18" charset="0"/>
               </a:rPr>
               <a:t>A, </a:t>
             </a:r>
             <a:r>
-              <a:rPr lang="en" sz="2800" b="1" i="1" dirty="0">
+              <a:rPr lang="en" sz="3600" b="1" i="1" dirty="0">
                 <a:latin typeface="Times New Roman" panose="02020603050405020304" pitchFamily="18" charset="0"/>
                 <a:cs typeface="Times New Roman" panose="02020603050405020304" pitchFamily="18" charset="0"/>
               </a:rPr>
               <a:t>L</a:t>
             </a:r>
             <a:r>
-              <a:rPr lang="en" sz="2800" b="1" i="1" baseline="-25000" dirty="0">
+              <a:rPr lang="en" sz="3600" b="1" i="1" baseline="-25000" dirty="0">
                 <a:latin typeface="Times New Roman" panose="02020603050405020304" pitchFamily="18" charset="0"/>
                 <a:cs typeface="Times New Roman" panose="02020603050405020304" pitchFamily="18" charset="0"/>
               </a:rPr>
               <a:t>B</a:t>
             </a:r>
             <a:r>
-              <a:rPr lang="en" sz="2800" b="1" dirty="0">
+              <a:rPr lang="en" sz="3600" b="1" dirty="0">
                 <a:latin typeface="Times New Roman" panose="02020603050405020304" pitchFamily="18" charset="0"/>
                 <a:cs typeface="Times New Roman" panose="02020603050405020304" pitchFamily="18" charset="0"/>
               </a:rPr>
               <a:t> Induction</a:t>
             </a:r>
-            <a:endParaRPr sz="2800" b="1" dirty="0">
+            <a:endParaRPr sz="3600" b="1" dirty="0">
               <a:latin typeface="Times New Roman" panose="02020603050405020304" pitchFamily="18" charset="0"/>
               <a:cs typeface="Times New Roman" panose="02020603050405020304" pitchFamily="18" charset="0"/>
             </a:endParaRPr>
@@ -7431,10 +7387,1031 @@
       </p:sp>
       <p:sp>
         <p:nvSpPr>
-          <p:cNvPr id="282" name="Multiply 281">
+          <p:cNvPr id="287" name="Google Shape;320;p28">
             <a:extLst>
               <a:ext uri="{FF2B5EF4-FFF2-40B4-BE49-F238E27FC236}">
-                <a16:creationId xmlns:a16="http://schemas.microsoft.com/office/drawing/2014/main" id="{8D282232-EEB2-05AC-FCCA-71C32D8F0BE1}"/>
+                <a16:creationId xmlns:a16="http://schemas.microsoft.com/office/drawing/2014/main" id="{6644CDC9-F97E-B9CB-AFB0-EFDB9E636F26}"/>
+              </a:ext>
+            </a:extLst>
+          </p:cNvPr>
+          <p:cNvSpPr txBox="1"/>
+          <p:nvPr/>
+        </p:nvSpPr>
+        <p:spPr>
+          <a:xfrm>
+            <a:off x="15871711" y="19432282"/>
+            <a:ext cx="3362277" cy="738633"/>
+          </a:xfrm>
+          <a:prstGeom prst="rect">
+            <a:avLst/>
+          </a:prstGeom>
+          <a:noFill/>
+          <a:ln>
+            <a:noFill/>
+          </a:ln>
+        </p:spPr>
+        <p:txBody>
+          <a:bodyPr spcFirstLastPara="1" wrap="square" lIns="91425" tIns="91425" rIns="91425" bIns="91425" anchor="t" anchorCtr="0">
+            <a:spAutoFit/>
+          </a:bodyPr>
+          <a:lstStyle/>
+          <a:p>
+            <a:pPr marL="0" lvl="0" indent="0" algn="l" rtl="0">
+              <a:spcBef>
+                <a:spcPts val="0"/>
+              </a:spcBef>
+              <a:spcAft>
+                <a:spcPts val="0"/>
+              </a:spcAft>
+              <a:buNone/>
+            </a:pPr>
+            <a:r>
+              <a:rPr lang="en" sz="3600" b="1" dirty="0">
+                <a:latin typeface="Times New Roman" panose="02020603050405020304" pitchFamily="18" charset="0"/>
+                <a:cs typeface="Times New Roman" panose="02020603050405020304" pitchFamily="18" charset="0"/>
+              </a:rPr>
+              <a:t>No</a:t>
+            </a:r>
+            <a:r>
+              <a:rPr lang="en" sz="3600" b="1" i="1" dirty="0">
+                <a:latin typeface="Times New Roman" panose="02020603050405020304" pitchFamily="18" charset="0"/>
+                <a:cs typeface="Times New Roman" panose="02020603050405020304" pitchFamily="18" charset="0"/>
+              </a:rPr>
+              <a:t> L</a:t>
+            </a:r>
+            <a:r>
+              <a:rPr lang="en" sz="3600" b="1" i="1" baseline="-25000" dirty="0">
+                <a:latin typeface="Times New Roman" panose="02020603050405020304" pitchFamily="18" charset="0"/>
+                <a:cs typeface="Times New Roman" panose="02020603050405020304" pitchFamily="18" charset="0"/>
+              </a:rPr>
+              <a:t>A</a:t>
+            </a:r>
+            <a:r>
+              <a:rPr lang="en" sz="3600" b="1" dirty="0">
+                <a:latin typeface="Times New Roman" panose="02020603050405020304" pitchFamily="18" charset="0"/>
+                <a:cs typeface="Times New Roman" panose="02020603050405020304" pitchFamily="18" charset="0"/>
+              </a:rPr>
+              <a:t> Induction</a:t>
+            </a:r>
+            <a:endParaRPr sz="3600" b="1" dirty="0">
+              <a:latin typeface="Times New Roman" panose="02020603050405020304" pitchFamily="18" charset="0"/>
+              <a:cs typeface="Times New Roman" panose="02020603050405020304" pitchFamily="18" charset="0"/>
+            </a:endParaRPr>
+          </a:p>
+        </p:txBody>
+      </p:sp>
+      <p:pic>
+        <p:nvPicPr>
+          <p:cNvPr id="293" name="Picture 292" descr="A picture containing text, screenshot, colorfulness, font&#10;&#10;Description automatically generated">
+            <a:extLst>
+              <a:ext uri="{FF2B5EF4-FFF2-40B4-BE49-F238E27FC236}">
+                <a16:creationId xmlns:a16="http://schemas.microsoft.com/office/drawing/2014/main" id="{4A8B659D-9BFA-5720-EDB2-2BD5982DBA2C}"/>
+              </a:ext>
+            </a:extLst>
+          </p:cNvPr>
+          <p:cNvPicPr>
+            <a:picLocks noChangeAspect="1"/>
+          </p:cNvPicPr>
+          <p:nvPr/>
+        </p:nvPicPr>
+        <p:blipFill rotWithShape="1">
+          <a:blip r:embed="rId23"/>
+          <a:srcRect l="86889" r="6296" b="14070"/>
+          <a:stretch/>
+        </p:blipFill>
+        <p:spPr>
+          <a:xfrm>
+            <a:off x="30309240" y="19777052"/>
+            <a:ext cx="423285" cy="4249335"/>
+          </a:xfrm>
+          <a:prstGeom prst="rect">
+            <a:avLst/>
+          </a:prstGeom>
+        </p:spPr>
+      </p:pic>
+      <p:sp>
+        <p:nvSpPr>
+          <p:cNvPr id="308" name="Google Shape;320;p28">
+            <a:extLst>
+              <a:ext uri="{FF2B5EF4-FFF2-40B4-BE49-F238E27FC236}">
+                <a16:creationId xmlns:a16="http://schemas.microsoft.com/office/drawing/2014/main" id="{73F2A43B-5AE7-A8C9-94A7-8B09C37AD568}"/>
+              </a:ext>
+            </a:extLst>
+          </p:cNvPr>
+          <p:cNvSpPr txBox="1"/>
+          <p:nvPr/>
+        </p:nvSpPr>
+        <p:spPr>
+          <a:xfrm>
+            <a:off x="15765237" y="23453173"/>
+            <a:ext cx="3495450" cy="738633"/>
+          </a:xfrm>
+          <a:prstGeom prst="rect">
+            <a:avLst/>
+          </a:prstGeom>
+          <a:noFill/>
+          <a:ln>
+            <a:noFill/>
+          </a:ln>
+        </p:spPr>
+        <p:txBody>
+          <a:bodyPr spcFirstLastPara="1" wrap="square" lIns="91425" tIns="91425" rIns="91425" bIns="91425" anchor="t" anchorCtr="0">
+            <a:spAutoFit/>
+          </a:bodyPr>
+          <a:lstStyle/>
+          <a:p>
+            <a:pPr marL="0" lvl="0" indent="0" algn="l" rtl="0">
+              <a:spcBef>
+                <a:spcPts val="0"/>
+              </a:spcBef>
+              <a:spcAft>
+                <a:spcPts val="0"/>
+              </a:spcAft>
+              <a:buNone/>
+            </a:pPr>
+            <a:r>
+              <a:rPr lang="en" sz="3600" b="1" dirty="0">
+                <a:latin typeface="Times New Roman" panose="02020603050405020304" pitchFamily="18" charset="0"/>
+                <a:cs typeface="Times New Roman" panose="02020603050405020304" pitchFamily="18" charset="0"/>
+              </a:rPr>
+              <a:t>No</a:t>
+            </a:r>
+            <a:r>
+              <a:rPr lang="en" sz="3600" b="1" i="1" dirty="0">
+                <a:latin typeface="Times New Roman" panose="02020603050405020304" pitchFamily="18" charset="0"/>
+                <a:cs typeface="Times New Roman" panose="02020603050405020304" pitchFamily="18" charset="0"/>
+              </a:rPr>
+              <a:t> L</a:t>
+            </a:r>
+            <a:r>
+              <a:rPr lang="en" sz="3600" b="1" i="1" baseline="-25000" dirty="0">
+                <a:latin typeface="Times New Roman" panose="02020603050405020304" pitchFamily="18" charset="0"/>
+                <a:cs typeface="Times New Roman" panose="02020603050405020304" pitchFamily="18" charset="0"/>
+              </a:rPr>
+              <a:t>B</a:t>
+            </a:r>
+            <a:r>
+              <a:rPr lang="en" sz="3600" b="1" dirty="0">
+                <a:latin typeface="Times New Roman" panose="02020603050405020304" pitchFamily="18" charset="0"/>
+                <a:cs typeface="Times New Roman" panose="02020603050405020304" pitchFamily="18" charset="0"/>
+              </a:rPr>
+              <a:t> Induction</a:t>
+            </a:r>
+            <a:endParaRPr sz="3600" b="1" dirty="0">
+              <a:latin typeface="Times New Roman" panose="02020603050405020304" pitchFamily="18" charset="0"/>
+              <a:cs typeface="Times New Roman" panose="02020603050405020304" pitchFamily="18" charset="0"/>
+            </a:endParaRPr>
+          </a:p>
+        </p:txBody>
+      </p:sp>
+      <p:grpSp>
+        <p:nvGrpSpPr>
+          <p:cNvPr id="363" name="Group 362">
+            <a:extLst>
+              <a:ext uri="{FF2B5EF4-FFF2-40B4-BE49-F238E27FC236}">
+                <a16:creationId xmlns:a16="http://schemas.microsoft.com/office/drawing/2014/main" id="{5CB4B0F3-C462-2873-522C-E4CC235A31D5}"/>
+              </a:ext>
+            </a:extLst>
+          </p:cNvPr>
+          <p:cNvGrpSpPr/>
+          <p:nvPr/>
+        </p:nvGrpSpPr>
+        <p:grpSpPr>
+          <a:xfrm>
+            <a:off x="19287342" y="18986880"/>
+            <a:ext cx="10795338" cy="1838525"/>
+            <a:chOff x="19364798" y="18852927"/>
+            <a:chExt cx="10795338" cy="1838525"/>
+          </a:xfrm>
+        </p:grpSpPr>
+        <p:pic>
+          <p:nvPicPr>
+            <p:cNvPr id="288" name="Picture 287" descr="A picture containing text, screenshot, electric blue, line&#10;&#10;Description automatically generated">
+              <a:extLst>
+                <a:ext uri="{FF2B5EF4-FFF2-40B4-BE49-F238E27FC236}">
+                  <a16:creationId xmlns:a16="http://schemas.microsoft.com/office/drawing/2014/main" id="{6BB53E8C-A787-8016-F447-1BD59C9B0C8C}"/>
+                </a:ext>
+              </a:extLst>
+            </p:cNvPr>
+            <p:cNvPicPr>
+              <a:picLocks noChangeAspect="1"/>
+            </p:cNvPicPr>
+            <p:nvPr/>
+          </p:nvPicPr>
+          <p:blipFill rotWithShape="1">
+            <a:blip r:embed="rId24"/>
+            <a:srcRect l="15650" t="7001" r="16708" b="19286"/>
+            <a:stretch/>
+          </p:blipFill>
+          <p:spPr>
+            <a:xfrm>
+              <a:off x="19364798" y="18862652"/>
+              <a:ext cx="2107547" cy="1828800"/>
+            </a:xfrm>
+            <a:prstGeom prst="rect">
+              <a:avLst/>
+            </a:prstGeom>
+          </p:spPr>
+        </p:pic>
+        <p:pic>
+          <p:nvPicPr>
+            <p:cNvPr id="289" name="Picture 288" descr="A picture containing text, screenshot, colorfulness&#10;&#10;Description automatically generated">
+              <a:extLst>
+                <a:ext uri="{FF2B5EF4-FFF2-40B4-BE49-F238E27FC236}">
+                  <a16:creationId xmlns:a16="http://schemas.microsoft.com/office/drawing/2014/main" id="{EF9130FD-E367-DAE9-1808-40E325778A29}"/>
+                </a:ext>
+              </a:extLst>
+            </p:cNvPr>
+            <p:cNvPicPr>
+              <a:picLocks noChangeAspect="1"/>
+            </p:cNvPicPr>
+            <p:nvPr/>
+          </p:nvPicPr>
+          <p:blipFill rotWithShape="1">
+            <a:blip r:embed="rId25"/>
+            <a:srcRect l="15543" t="6848" r="15753" b="17528"/>
+            <a:stretch/>
+          </p:blipFill>
+          <p:spPr>
+            <a:xfrm>
+              <a:off x="21533221" y="18862652"/>
+              <a:ext cx="2086542" cy="1828800"/>
+            </a:xfrm>
+            <a:prstGeom prst="rect">
+              <a:avLst/>
+            </a:prstGeom>
+          </p:spPr>
+        </p:pic>
+        <p:pic>
+          <p:nvPicPr>
+            <p:cNvPr id="290" name="Picture 289" descr="A picture containing text, screenshot, colorfulness, font&#10;&#10;Description automatically generated">
+              <a:extLst>
+                <a:ext uri="{FF2B5EF4-FFF2-40B4-BE49-F238E27FC236}">
+                  <a16:creationId xmlns:a16="http://schemas.microsoft.com/office/drawing/2014/main" id="{437A0158-D52A-8A74-F301-19DECD227A27}"/>
+                </a:ext>
+              </a:extLst>
+            </p:cNvPr>
+            <p:cNvPicPr>
+              <a:picLocks noChangeAspect="1"/>
+            </p:cNvPicPr>
+            <p:nvPr/>
+          </p:nvPicPr>
+          <p:blipFill rotWithShape="1">
+            <a:blip r:embed="rId26"/>
+            <a:srcRect l="16040" t="8069" r="15927" b="18180"/>
+            <a:stretch/>
+          </p:blipFill>
+          <p:spPr>
+            <a:xfrm>
+              <a:off x="23695411" y="18857005"/>
+              <a:ext cx="2118660" cy="1828800"/>
+            </a:xfrm>
+            <a:prstGeom prst="rect">
+              <a:avLst/>
+            </a:prstGeom>
+          </p:spPr>
+        </p:pic>
+        <p:pic>
+          <p:nvPicPr>
+            <p:cNvPr id="291" name="Picture 290" descr="A picture containing text, screenshot, colorfulness, red&#10;&#10;Description automatically generated">
+              <a:extLst>
+                <a:ext uri="{FF2B5EF4-FFF2-40B4-BE49-F238E27FC236}">
+                  <a16:creationId xmlns:a16="http://schemas.microsoft.com/office/drawing/2014/main" id="{8BE64A65-51D9-08F0-4B80-5499D6D78B99}"/>
+                </a:ext>
+              </a:extLst>
+            </p:cNvPr>
+            <p:cNvPicPr>
+              <a:picLocks noChangeAspect="1"/>
+            </p:cNvPicPr>
+            <p:nvPr/>
+          </p:nvPicPr>
+          <p:blipFill rotWithShape="1">
+            <a:blip r:embed="rId27"/>
+            <a:srcRect l="15989" t="7546" r="16744" b="18926"/>
+            <a:stretch/>
+          </p:blipFill>
+          <p:spPr>
+            <a:xfrm>
+              <a:off x="25876927" y="18852927"/>
+              <a:ext cx="2101142" cy="1828800"/>
+            </a:xfrm>
+            <a:prstGeom prst="rect">
+              <a:avLst/>
+            </a:prstGeom>
+          </p:spPr>
+        </p:pic>
+        <p:pic>
+          <p:nvPicPr>
+            <p:cNvPr id="310" name="Picture 309" descr="A picture containing text, screenshot, colorfulness, font&#10;&#10;Description automatically generated">
+              <a:extLst>
+                <a:ext uri="{FF2B5EF4-FFF2-40B4-BE49-F238E27FC236}">
+                  <a16:creationId xmlns:a16="http://schemas.microsoft.com/office/drawing/2014/main" id="{1AAB032C-B1B6-FB32-F639-FFFF89E8C8C2}"/>
+                </a:ext>
+              </a:extLst>
+            </p:cNvPr>
+            <p:cNvPicPr>
+              <a:picLocks noChangeAspect="1"/>
+            </p:cNvPicPr>
+            <p:nvPr/>
+          </p:nvPicPr>
+          <p:blipFill rotWithShape="1">
+            <a:blip r:embed="rId23"/>
+            <a:srcRect l="16076" t="7777" r="16754" b="18802"/>
+            <a:stretch/>
+          </p:blipFill>
+          <p:spPr>
+            <a:xfrm>
+              <a:off x="28058994" y="18862652"/>
+              <a:ext cx="2101142" cy="1828800"/>
+            </a:xfrm>
+            <a:prstGeom prst="rect">
+              <a:avLst/>
+            </a:prstGeom>
+          </p:spPr>
+        </p:pic>
+      </p:grpSp>
+      <p:grpSp>
+        <p:nvGrpSpPr>
+          <p:cNvPr id="361" name="Group 360">
+            <a:extLst>
+              <a:ext uri="{FF2B5EF4-FFF2-40B4-BE49-F238E27FC236}">
+                <a16:creationId xmlns:a16="http://schemas.microsoft.com/office/drawing/2014/main" id="{948DF2C1-553B-E7C0-DA2C-8A9D5505DB5A}"/>
+              </a:ext>
+            </a:extLst>
+          </p:cNvPr>
+          <p:cNvGrpSpPr/>
+          <p:nvPr/>
+        </p:nvGrpSpPr>
+        <p:grpSpPr>
+          <a:xfrm>
+            <a:off x="19293197" y="21076970"/>
+            <a:ext cx="10778866" cy="1844136"/>
+            <a:chOff x="19386009" y="20879889"/>
+            <a:chExt cx="10778866" cy="1844136"/>
+          </a:xfrm>
+        </p:grpSpPr>
+        <p:pic>
+          <p:nvPicPr>
+            <p:cNvPr id="299" name="Picture 298" descr="A picture containing text, screenshot, electric blue, line&#10;&#10;Description automatically generated">
+              <a:extLst>
+                <a:ext uri="{FF2B5EF4-FFF2-40B4-BE49-F238E27FC236}">
+                  <a16:creationId xmlns:a16="http://schemas.microsoft.com/office/drawing/2014/main" id="{1213D3D7-AD91-F1FB-FFBA-A3FF0B2C6BB8}"/>
+                </a:ext>
+              </a:extLst>
+            </p:cNvPr>
+            <p:cNvPicPr>
+              <a:picLocks noChangeAspect="1"/>
+            </p:cNvPicPr>
+            <p:nvPr/>
+          </p:nvPicPr>
+          <p:blipFill rotWithShape="1">
+            <a:blip r:embed="rId28"/>
+            <a:srcRect l="16154" t="6665" r="16971" b="17531"/>
+            <a:stretch/>
+          </p:blipFill>
+          <p:spPr>
+            <a:xfrm>
+              <a:off x="19386009" y="20893007"/>
+              <a:ext cx="2090464" cy="1831018"/>
+            </a:xfrm>
+            <a:prstGeom prst="rect">
+              <a:avLst/>
+            </a:prstGeom>
+          </p:spPr>
+        </p:pic>
+        <p:pic>
+          <p:nvPicPr>
+            <p:cNvPr id="301" name="Picture 300" descr="A picture containing text, screenshot, colorfulness, font&#10;&#10;Description automatically generated">
+              <a:extLst>
+                <a:ext uri="{FF2B5EF4-FFF2-40B4-BE49-F238E27FC236}">
+                  <a16:creationId xmlns:a16="http://schemas.microsoft.com/office/drawing/2014/main" id="{BDCA6E24-3A89-7B67-32B0-B5FB2BCED315}"/>
+                </a:ext>
+              </a:extLst>
+            </p:cNvPr>
+            <p:cNvPicPr>
+              <a:picLocks noChangeAspect="1"/>
+            </p:cNvPicPr>
+            <p:nvPr/>
+          </p:nvPicPr>
+          <p:blipFill rotWithShape="1">
+            <a:blip r:embed="rId29"/>
+            <a:srcRect l="16747" t="6836" r="16922" b="16930"/>
+            <a:stretch/>
+          </p:blipFill>
+          <p:spPr>
+            <a:xfrm>
+              <a:off x="21545586" y="20879889"/>
+              <a:ext cx="2061812" cy="1831018"/>
+            </a:xfrm>
+            <a:prstGeom prst="rect">
+              <a:avLst/>
+            </a:prstGeom>
+          </p:spPr>
+        </p:pic>
+        <p:pic>
+          <p:nvPicPr>
+            <p:cNvPr id="303" name="Picture 302" descr="A picture containing text, screenshot, colorfulness, font&#10;&#10;Description automatically generated">
+              <a:extLst>
+                <a:ext uri="{FF2B5EF4-FFF2-40B4-BE49-F238E27FC236}">
+                  <a16:creationId xmlns:a16="http://schemas.microsoft.com/office/drawing/2014/main" id="{E4A86B8E-FA8C-748C-F975-2F4ED71237FA}"/>
+                </a:ext>
+              </a:extLst>
+            </p:cNvPr>
+            <p:cNvPicPr>
+              <a:picLocks noChangeAspect="1"/>
+            </p:cNvPicPr>
+            <p:nvPr/>
+          </p:nvPicPr>
+          <p:blipFill rotWithShape="1">
+            <a:blip r:embed="rId30"/>
+            <a:srcRect l="8282" t="18037" r="18461" b="16469"/>
+            <a:stretch/>
+          </p:blipFill>
+          <p:spPr>
+            <a:xfrm rot="5400000">
+              <a:off x="23851049" y="20776939"/>
+              <a:ext cx="1782823" cy="2061811"/>
+            </a:xfrm>
+            <a:prstGeom prst="rect">
+              <a:avLst/>
+            </a:prstGeom>
+          </p:spPr>
+        </p:pic>
+        <p:pic>
+          <p:nvPicPr>
+            <p:cNvPr id="305" name="Picture 304" descr="A picture containing text, screenshot, font, colorfulness&#10;&#10;Description automatically generated">
+              <a:extLst>
+                <a:ext uri="{FF2B5EF4-FFF2-40B4-BE49-F238E27FC236}">
+                  <a16:creationId xmlns:a16="http://schemas.microsoft.com/office/drawing/2014/main" id="{67D6AAE2-810C-0063-C438-513F9A808B2A}"/>
+                </a:ext>
+              </a:extLst>
+            </p:cNvPr>
+            <p:cNvPicPr>
+              <a:picLocks noChangeAspect="1"/>
+            </p:cNvPicPr>
+            <p:nvPr/>
+          </p:nvPicPr>
+          <p:blipFill rotWithShape="1">
+            <a:blip r:embed="rId31"/>
+            <a:srcRect l="7711" t="17374" r="18282" b="15764"/>
+            <a:stretch/>
+          </p:blipFill>
+          <p:spPr>
+            <a:xfrm rot="5400000">
+              <a:off x="26006339" y="20739684"/>
+              <a:ext cx="1790943" cy="2118660"/>
+            </a:xfrm>
+            <a:prstGeom prst="rect">
+              <a:avLst/>
+            </a:prstGeom>
+          </p:spPr>
+        </p:pic>
+        <p:pic>
+          <p:nvPicPr>
+            <p:cNvPr id="311" name="Picture 310" descr="A picture containing text, screenshot, colorfulness, font&#10;&#10;Description automatically generated">
+              <a:extLst>
+                <a:ext uri="{FF2B5EF4-FFF2-40B4-BE49-F238E27FC236}">
+                  <a16:creationId xmlns:a16="http://schemas.microsoft.com/office/drawing/2014/main" id="{696258D4-E72A-2069-960F-B5098AEE19AD}"/>
+                </a:ext>
+              </a:extLst>
+            </p:cNvPr>
+            <p:cNvPicPr>
+              <a:picLocks noChangeAspect="1"/>
+            </p:cNvPicPr>
+            <p:nvPr/>
+          </p:nvPicPr>
+          <p:blipFill rotWithShape="1">
+            <a:blip r:embed="rId32"/>
+            <a:srcRect l="7642" t="17631" r="18189" b="15764"/>
+            <a:stretch/>
+          </p:blipFill>
+          <p:spPr>
+            <a:xfrm rot="5400000">
+              <a:off x="28197908" y="20749801"/>
+              <a:ext cx="1790944" cy="2142991"/>
+            </a:xfrm>
+            <a:prstGeom prst="rect">
+              <a:avLst/>
+            </a:prstGeom>
+          </p:spPr>
+        </p:pic>
+      </p:grpSp>
+      <p:grpSp>
+        <p:nvGrpSpPr>
+          <p:cNvPr id="362" name="Group 361">
+            <a:extLst>
+              <a:ext uri="{FF2B5EF4-FFF2-40B4-BE49-F238E27FC236}">
+                <a16:creationId xmlns:a16="http://schemas.microsoft.com/office/drawing/2014/main" id="{D172D3C2-3685-6C9F-202F-D06FC1D0907C}"/>
+              </a:ext>
+            </a:extLst>
+          </p:cNvPr>
+          <p:cNvGrpSpPr/>
+          <p:nvPr/>
+        </p:nvGrpSpPr>
+        <p:grpSpPr>
+          <a:xfrm>
+            <a:off x="19287342" y="23160571"/>
+            <a:ext cx="10864416" cy="1842015"/>
+            <a:chOff x="19337823" y="22966323"/>
+            <a:chExt cx="10864416" cy="1842015"/>
+          </a:xfrm>
+        </p:grpSpPr>
+        <p:pic>
+          <p:nvPicPr>
+            <p:cNvPr id="329" name="Picture 328" descr="A picture containing text, screenshot, electric blue, line&#10;&#10;Description automatically generated">
+              <a:extLst>
+                <a:ext uri="{FF2B5EF4-FFF2-40B4-BE49-F238E27FC236}">
+                  <a16:creationId xmlns:a16="http://schemas.microsoft.com/office/drawing/2014/main" id="{0ABDE973-1C67-60E0-A780-03A48D8767B3}"/>
+                </a:ext>
+              </a:extLst>
+            </p:cNvPr>
+            <p:cNvPicPr>
+              <a:picLocks noChangeAspect="1"/>
+            </p:cNvPicPr>
+            <p:nvPr/>
+          </p:nvPicPr>
+          <p:blipFill rotWithShape="1">
+            <a:blip r:embed="rId33"/>
+            <a:srcRect l="8083" t="17510" r="19724" b="17380"/>
+            <a:stretch/>
+          </p:blipFill>
+          <p:spPr>
+            <a:xfrm rot="5400000">
+              <a:off x="19490363" y="22828500"/>
+              <a:ext cx="1824969" cy="2130049"/>
+            </a:xfrm>
+            <a:prstGeom prst="rect">
+              <a:avLst/>
+            </a:prstGeom>
+          </p:spPr>
+        </p:pic>
+        <p:pic>
+          <p:nvPicPr>
+            <p:cNvPr id="331" name="Picture 330" descr="A picture containing text, screenshot, electric blue, line&#10;&#10;Description automatically generated">
+              <a:extLst>
+                <a:ext uri="{FF2B5EF4-FFF2-40B4-BE49-F238E27FC236}">
+                  <a16:creationId xmlns:a16="http://schemas.microsoft.com/office/drawing/2014/main" id="{B58F3B54-DCFE-E426-D9B1-DFF1C0404A50}"/>
+                </a:ext>
+              </a:extLst>
+            </p:cNvPr>
+            <p:cNvPicPr>
+              <a:picLocks noChangeAspect="1"/>
+            </p:cNvPicPr>
+            <p:nvPr/>
+          </p:nvPicPr>
+          <p:blipFill rotWithShape="1">
+            <a:blip r:embed="rId34"/>
+            <a:srcRect l="7624" t="17288" r="19755" b="16278"/>
+            <a:stretch/>
+          </p:blipFill>
+          <p:spPr>
+            <a:xfrm rot="5400000">
+              <a:off x="21688101" y="22823773"/>
+              <a:ext cx="1815318" cy="2149154"/>
+            </a:xfrm>
+            <a:prstGeom prst="rect">
+              <a:avLst/>
+            </a:prstGeom>
+          </p:spPr>
+        </p:pic>
+        <p:pic>
+          <p:nvPicPr>
+            <p:cNvPr id="333" name="Picture 332" descr="A picture containing text, screenshot, electric blue, line&#10;&#10;Description automatically generated">
+              <a:extLst>
+                <a:ext uri="{FF2B5EF4-FFF2-40B4-BE49-F238E27FC236}">
+                  <a16:creationId xmlns:a16="http://schemas.microsoft.com/office/drawing/2014/main" id="{EA74ECC1-DACC-59A8-0B18-5C6E9103C2C0}"/>
+                </a:ext>
+              </a:extLst>
+            </p:cNvPr>
+            <p:cNvPicPr>
+              <a:picLocks noChangeAspect="1"/>
+            </p:cNvPicPr>
+            <p:nvPr/>
+          </p:nvPicPr>
+          <p:blipFill rotWithShape="1">
+            <a:blip r:embed="rId35"/>
+            <a:srcRect l="7517" t="18159" r="18561" b="17102"/>
+            <a:stretch/>
+          </p:blipFill>
+          <p:spPr>
+            <a:xfrm rot="5400000">
+              <a:off x="23866293" y="22869653"/>
+              <a:ext cx="1815320" cy="2057397"/>
+            </a:xfrm>
+            <a:prstGeom prst="rect">
+              <a:avLst/>
+            </a:prstGeom>
+          </p:spPr>
+        </p:pic>
+        <p:pic>
+          <p:nvPicPr>
+            <p:cNvPr id="335" name="Picture 334" descr="A picture containing text, screenshot, electric blue, line&#10;&#10;Description automatically generated">
+              <a:extLst>
+                <a:ext uri="{FF2B5EF4-FFF2-40B4-BE49-F238E27FC236}">
+                  <a16:creationId xmlns:a16="http://schemas.microsoft.com/office/drawing/2014/main" id="{35FC57F2-FCCC-3463-2E3A-492C8200446E}"/>
+                </a:ext>
+              </a:extLst>
+            </p:cNvPr>
+            <p:cNvPicPr>
+              <a:picLocks noChangeAspect="1"/>
+            </p:cNvPicPr>
+            <p:nvPr/>
+          </p:nvPicPr>
+          <p:blipFill rotWithShape="1">
+            <a:blip r:embed="rId36"/>
+            <a:srcRect l="7931" t="17174" r="18292" b="17373"/>
+            <a:stretch/>
+          </p:blipFill>
+          <p:spPr>
+            <a:xfrm rot="5400000">
+              <a:off x="26011374" y="22858572"/>
+              <a:ext cx="1815319" cy="2084214"/>
+            </a:xfrm>
+            <a:prstGeom prst="rect">
+              <a:avLst/>
+            </a:prstGeom>
+          </p:spPr>
+        </p:pic>
+        <p:pic>
+          <p:nvPicPr>
+            <p:cNvPr id="337" name="Picture 336" descr="A picture containing text, screenshot, electric blue, line&#10;&#10;Description automatically generated">
+              <a:extLst>
+                <a:ext uri="{FF2B5EF4-FFF2-40B4-BE49-F238E27FC236}">
+                  <a16:creationId xmlns:a16="http://schemas.microsoft.com/office/drawing/2014/main" id="{EADCD86D-709B-0658-C1CC-A4BF000AB6B8}"/>
+                </a:ext>
+              </a:extLst>
+            </p:cNvPr>
+            <p:cNvPicPr>
+              <a:picLocks noChangeAspect="1"/>
+            </p:cNvPicPr>
+            <p:nvPr/>
+          </p:nvPicPr>
+          <p:blipFill rotWithShape="1">
+            <a:blip r:embed="rId37"/>
+            <a:srcRect l="6562" t="16666" r="20520" b="17510"/>
+            <a:stretch/>
+          </p:blipFill>
+          <p:spPr>
+            <a:xfrm rot="5400000">
+              <a:off x="28207819" y="22811589"/>
+              <a:ext cx="1839686" cy="2149154"/>
+            </a:xfrm>
+            <a:prstGeom prst="rect">
+              <a:avLst/>
+            </a:prstGeom>
+          </p:spPr>
+        </p:pic>
+      </p:grpSp>
+      <p:sp>
+        <p:nvSpPr>
+          <p:cNvPr id="338" name="TextBox 337">
+            <a:extLst>
+              <a:ext uri="{FF2B5EF4-FFF2-40B4-BE49-F238E27FC236}">
+                <a16:creationId xmlns:a16="http://schemas.microsoft.com/office/drawing/2014/main" id="{3169AE45-18AB-A658-2202-AE0B7599E938}"/>
+              </a:ext>
+            </a:extLst>
+          </p:cNvPr>
+          <p:cNvSpPr txBox="1"/>
+          <p:nvPr/>
+        </p:nvSpPr>
+        <p:spPr>
+          <a:xfrm>
+            <a:off x="15650083" y="18713705"/>
+            <a:ext cx="911292" cy="638720"/>
+          </a:xfrm>
+          <a:prstGeom prst="rect">
+            <a:avLst/>
+          </a:prstGeom>
+          <a:noFill/>
+        </p:spPr>
+        <p:txBody>
+          <a:bodyPr wrap="square" rtlCol="0">
+            <a:spAutoFit/>
+          </a:bodyPr>
+          <a:lstStyle/>
+          <a:p>
+            <a:pPr algn="ctr"/>
+            <a:r>
+              <a:rPr lang="en-US" sz="3000" b="1" dirty="0">
+                <a:latin typeface="Times New Roman" panose="02020603050405020304" pitchFamily="18" charset="0"/>
+                <a:cs typeface="Times New Roman" panose="02020603050405020304" pitchFamily="18" charset="0"/>
+              </a:rPr>
+              <a:t>(a)</a:t>
+            </a:r>
+          </a:p>
+        </p:txBody>
+      </p:sp>
+      <p:sp>
+        <p:nvSpPr>
+          <p:cNvPr id="339" name="TextBox 338">
+            <a:extLst>
+              <a:ext uri="{FF2B5EF4-FFF2-40B4-BE49-F238E27FC236}">
+                <a16:creationId xmlns:a16="http://schemas.microsoft.com/office/drawing/2014/main" id="{39947C1F-ECD1-637D-046C-4793A8ED95E2}"/>
+              </a:ext>
+            </a:extLst>
+          </p:cNvPr>
+          <p:cNvSpPr txBox="1"/>
+          <p:nvPr/>
+        </p:nvSpPr>
+        <p:spPr>
+          <a:xfrm>
+            <a:off x="15650083" y="20715537"/>
+            <a:ext cx="911292" cy="553998"/>
+          </a:xfrm>
+          <a:prstGeom prst="rect">
+            <a:avLst/>
+          </a:prstGeom>
+          <a:noFill/>
+        </p:spPr>
+        <p:txBody>
+          <a:bodyPr wrap="square" rtlCol="0">
+            <a:spAutoFit/>
+          </a:bodyPr>
+          <a:lstStyle/>
+          <a:p>
+            <a:pPr algn="ctr"/>
+            <a:r>
+              <a:rPr lang="en-US" sz="3000" b="1" dirty="0">
+                <a:latin typeface="Times New Roman" panose="02020603050405020304" pitchFamily="18" charset="0"/>
+                <a:cs typeface="Times New Roman" panose="02020603050405020304" pitchFamily="18" charset="0"/>
+              </a:rPr>
+              <a:t>(b)</a:t>
+            </a:r>
+          </a:p>
+        </p:txBody>
+      </p:sp>
+      <p:sp>
+        <p:nvSpPr>
+          <p:cNvPr id="340" name="TextBox 339">
+            <a:extLst>
+              <a:ext uri="{FF2B5EF4-FFF2-40B4-BE49-F238E27FC236}">
+                <a16:creationId xmlns:a16="http://schemas.microsoft.com/office/drawing/2014/main" id="{A83E60F8-017E-E845-A80B-51C989C85263}"/>
+              </a:ext>
+            </a:extLst>
+          </p:cNvPr>
+          <p:cNvSpPr txBox="1"/>
+          <p:nvPr/>
+        </p:nvSpPr>
+        <p:spPr>
+          <a:xfrm>
+            <a:off x="15654298" y="22866528"/>
+            <a:ext cx="911292" cy="553998"/>
+          </a:xfrm>
+          <a:prstGeom prst="rect">
+            <a:avLst/>
+          </a:prstGeom>
+          <a:noFill/>
+        </p:spPr>
+        <p:txBody>
+          <a:bodyPr wrap="square" rtlCol="0">
+            <a:spAutoFit/>
+          </a:bodyPr>
+          <a:lstStyle/>
+          <a:p>
+            <a:pPr algn="ctr"/>
+            <a:r>
+              <a:rPr lang="en-US" sz="3000" b="1" dirty="0">
+                <a:latin typeface="Times New Roman" panose="02020603050405020304" pitchFamily="18" charset="0"/>
+                <a:cs typeface="Times New Roman" panose="02020603050405020304" pitchFamily="18" charset="0"/>
+              </a:rPr>
+              <a:t>(c)</a:t>
+            </a:r>
+          </a:p>
+        </p:txBody>
+      </p:sp>
+      <p:sp>
+        <p:nvSpPr>
+          <p:cNvPr id="346" name="TextBox 345">
+            <a:extLst>
+              <a:ext uri="{FF2B5EF4-FFF2-40B4-BE49-F238E27FC236}">
+                <a16:creationId xmlns:a16="http://schemas.microsoft.com/office/drawing/2014/main" id="{A831D85A-6113-F851-0B6F-42C07B5F3682}"/>
+              </a:ext>
+            </a:extLst>
+          </p:cNvPr>
+          <p:cNvSpPr txBox="1"/>
+          <p:nvPr/>
+        </p:nvSpPr>
+        <p:spPr>
+          <a:xfrm>
+            <a:off x="159994" y="32082114"/>
+            <a:ext cx="15177565" cy="2246769"/>
+          </a:xfrm>
+          <a:prstGeom prst="rect">
+            <a:avLst/>
+          </a:prstGeom>
+          <a:noFill/>
+        </p:spPr>
+        <p:txBody>
+          <a:bodyPr wrap="square" rtlCol="0">
+            <a:spAutoFit/>
+          </a:bodyPr>
+          <a:lstStyle/>
+          <a:p>
+            <a:r>
+              <a:rPr lang="en-US" sz="2800" b="1" dirty="0">
+                <a:latin typeface="Avenir Book" panose="02000503020000020003" pitchFamily="2" charset="0"/>
+              </a:rPr>
+              <a:t>Figure 3. Steady-state trade off between growth and induction. (a) </a:t>
+            </a:r>
+            <a:r>
+              <a:rPr lang="en-US" sz="2800" dirty="0">
+                <a:latin typeface="Avenir Book" panose="02000503020000020003" pitchFamily="2" charset="0"/>
+              </a:rPr>
+              <a:t>For the steady-state lysogen population to remain constant, the growth rate must increase with increasing induction rate (black line). </a:t>
+            </a:r>
+            <a:r>
+              <a:rPr lang="en-US" sz="2800" b="1" dirty="0">
+                <a:latin typeface="Avenir Book" panose="02000503020000020003" pitchFamily="2" charset="0"/>
+              </a:rPr>
+              <a:t>(b)</a:t>
+            </a:r>
+            <a:r>
+              <a:rPr lang="en-US" sz="2800" dirty="0">
+                <a:latin typeface="Avenir Book" panose="02000503020000020003" pitchFamily="2" charset="0"/>
+              </a:rPr>
+              <a:t> The steady-state phage population </a:t>
+            </a:r>
+            <a:r>
+              <a:rPr kumimoji="0" lang="en-US" sz="2800" b="0" i="0" u="none" strike="noStrike" kern="1200" cap="none" spc="0" normalizeH="0" baseline="0" noProof="0" dirty="0">
+                <a:ln>
+                  <a:noFill/>
+                </a:ln>
+                <a:solidFill>
+                  <a:prstClr val="black"/>
+                </a:solidFill>
+                <a:effectLst/>
+                <a:uLnTx/>
+                <a:uFillTx/>
+                <a:latin typeface="Avenir Book" panose="02000503020000020003" pitchFamily="2" charset="0"/>
+                <a:ea typeface="+mn-ea"/>
+                <a:cs typeface="+mn-cs"/>
+              </a:rPr>
+              <a:t>increases with increasing induction. We perform invasion analysis from this growth-induction trade off to show the role of free phage given a fixed lysogen population density.</a:t>
+            </a:r>
+            <a:endParaRPr lang="en-US" sz="2800" dirty="0">
+              <a:latin typeface="Avenir Book" panose="02000503020000020003" pitchFamily="2" charset="0"/>
+            </a:endParaRPr>
+          </a:p>
+        </p:txBody>
+      </p:sp>
+      <p:pic>
+        <p:nvPicPr>
+          <p:cNvPr id="348" name="Picture 347">
+            <a:extLst>
+              <a:ext uri="{FF2B5EF4-FFF2-40B4-BE49-F238E27FC236}">
+                <a16:creationId xmlns:a16="http://schemas.microsoft.com/office/drawing/2014/main" id="{0FED1BE1-A7A5-82D0-C552-E4701FAC45D5}"/>
+              </a:ext>
+            </a:extLst>
+          </p:cNvPr>
+          <p:cNvPicPr>
+            <a:picLocks noChangeAspect="1"/>
+          </p:cNvPicPr>
+          <p:nvPr/>
+        </p:nvPicPr>
+        <p:blipFill>
+          <a:blip r:embed="rId38"/>
+          <a:stretch>
+            <a:fillRect/>
+          </a:stretch>
+        </p:blipFill>
+        <p:spPr>
+          <a:xfrm>
+            <a:off x="15833955" y="6866516"/>
+            <a:ext cx="1383304" cy="923295"/>
+          </a:xfrm>
+          <a:prstGeom prst="rect">
+            <a:avLst/>
+          </a:prstGeom>
+        </p:spPr>
+      </p:pic>
+      <p:pic>
+        <p:nvPicPr>
+          <p:cNvPr id="355" name="Picture 354" descr="A qr code with a cat&#10;&#10;Description automatically generated">
+            <a:extLst>
+              <a:ext uri="{FF2B5EF4-FFF2-40B4-BE49-F238E27FC236}">
+                <a16:creationId xmlns:a16="http://schemas.microsoft.com/office/drawing/2014/main" id="{09CC06D3-3276-C10A-A867-5BC6E7207BEF}"/>
+              </a:ext>
+            </a:extLst>
+          </p:cNvPr>
+          <p:cNvPicPr>
+            <a:picLocks noChangeAspect="1"/>
+          </p:cNvPicPr>
+          <p:nvPr/>
+        </p:nvPicPr>
+        <p:blipFill>
+          <a:blip r:embed="rId39"/>
+          <a:stretch>
+            <a:fillRect/>
+          </a:stretch>
+        </p:blipFill>
+        <p:spPr>
+          <a:xfrm>
+            <a:off x="329375" y="3717360"/>
+            <a:ext cx="1938528" cy="1938528"/>
+          </a:xfrm>
+          <a:prstGeom prst="rect">
+            <a:avLst/>
+          </a:prstGeom>
+        </p:spPr>
+      </p:pic>
+      <p:sp>
+        <p:nvSpPr>
+          <p:cNvPr id="359" name="TextBox 358">
+            <a:extLst>
+              <a:ext uri="{FF2B5EF4-FFF2-40B4-BE49-F238E27FC236}">
+                <a16:creationId xmlns:a16="http://schemas.microsoft.com/office/drawing/2014/main" id="{03DB05C6-186C-6AB8-05DA-6BC4F488C57D}"/>
+              </a:ext>
+            </a:extLst>
+          </p:cNvPr>
+          <p:cNvSpPr txBox="1"/>
+          <p:nvPr/>
+        </p:nvSpPr>
+        <p:spPr>
+          <a:xfrm>
+            <a:off x="30336450" y="23755363"/>
+            <a:ext cx="753140" cy="646331"/>
+          </a:xfrm>
+          <a:prstGeom prst="rect">
+            <a:avLst/>
+          </a:prstGeom>
+          <a:noFill/>
+        </p:spPr>
+        <p:txBody>
+          <a:bodyPr wrap="square">
+            <a:spAutoFit/>
+          </a:bodyPr>
+          <a:lstStyle/>
+          <a:p>
+            <a:r>
+              <a:rPr lang="en" sz="3600" b="1" i="1" dirty="0">
+                <a:latin typeface="Times New Roman" panose="02020603050405020304" pitchFamily="18" charset="0"/>
+                <a:cs typeface="Times New Roman" panose="02020603050405020304" pitchFamily="18" charset="0"/>
+              </a:rPr>
+              <a:t>L</a:t>
+            </a:r>
+            <a:r>
+              <a:rPr lang="en" sz="3600" b="1" i="1" baseline="-25000" dirty="0">
+                <a:latin typeface="Times New Roman" panose="02020603050405020304" pitchFamily="18" charset="0"/>
+                <a:cs typeface="Times New Roman" panose="02020603050405020304" pitchFamily="18" charset="0"/>
+              </a:rPr>
+              <a:t>A</a:t>
+            </a:r>
+            <a:endParaRPr lang="en-US" sz="3600" dirty="0"/>
+          </a:p>
+        </p:txBody>
+      </p:sp>
+      <p:sp>
+        <p:nvSpPr>
+          <p:cNvPr id="360" name="TextBox 359">
+            <a:extLst>
+              <a:ext uri="{FF2B5EF4-FFF2-40B4-BE49-F238E27FC236}">
+                <a16:creationId xmlns:a16="http://schemas.microsoft.com/office/drawing/2014/main" id="{EC2C301C-63E3-6084-DB29-B94BC645CC27}"/>
+              </a:ext>
+            </a:extLst>
+          </p:cNvPr>
+          <p:cNvSpPr txBox="1"/>
+          <p:nvPr/>
+        </p:nvSpPr>
+        <p:spPr>
+          <a:xfrm>
+            <a:off x="30321941" y="19510277"/>
+            <a:ext cx="753140" cy="646331"/>
+          </a:xfrm>
+          <a:prstGeom prst="rect">
+            <a:avLst/>
+          </a:prstGeom>
+          <a:noFill/>
+        </p:spPr>
+        <p:txBody>
+          <a:bodyPr wrap="square">
+            <a:spAutoFit/>
+          </a:bodyPr>
+          <a:lstStyle/>
+          <a:p>
+            <a:r>
+              <a:rPr lang="en" sz="3600" b="1" i="1" dirty="0">
+                <a:latin typeface="Times New Roman" panose="02020603050405020304" pitchFamily="18" charset="0"/>
+                <a:cs typeface="Times New Roman" panose="02020603050405020304" pitchFamily="18" charset="0"/>
+              </a:rPr>
+              <a:t>L</a:t>
+            </a:r>
+            <a:r>
+              <a:rPr lang="en" sz="3600" b="1" i="1" baseline="-25000" dirty="0">
+                <a:latin typeface="Times New Roman" panose="02020603050405020304" pitchFamily="18" charset="0"/>
+                <a:cs typeface="Times New Roman" panose="02020603050405020304" pitchFamily="18" charset="0"/>
+              </a:rPr>
+              <a:t>B</a:t>
+            </a:r>
+            <a:endParaRPr lang="en-US" sz="3600" dirty="0"/>
+          </a:p>
+        </p:txBody>
+      </p:sp>
+      <p:sp>
+        <p:nvSpPr>
+          <p:cNvPr id="364" name="Rectangle 363">
+            <a:extLst>
+              <a:ext uri="{FF2B5EF4-FFF2-40B4-BE49-F238E27FC236}">
+                <a16:creationId xmlns:a16="http://schemas.microsoft.com/office/drawing/2014/main" id="{B0DBAEF1-BB10-19BD-51EF-D98D77D8692F}"/>
               </a:ext>
             </a:extLst>
           </p:cNvPr>
@@ -7443,14 +8420,14 @@
         </p:nvSpPr>
         <p:spPr>
           <a:xfrm>
-            <a:off x="16883509" y="23792841"/>
-            <a:ext cx="882548" cy="835624"/>
-          </a:xfrm>
-          <a:prstGeom prst="mathMultiply">
+            <a:off x="30458664" y="14861569"/>
+            <a:ext cx="648653" cy="646331"/>
+          </a:xfrm>
+          <a:prstGeom prst="rect">
             <a:avLst/>
           </a:prstGeom>
           <a:solidFill>
-            <a:schemeClr val="tx1"/>
+            <a:schemeClr val="bg1"/>
           </a:solidFill>
           <a:ln>
             <a:noFill/>
@@ -7483,32 +8460,36 @@
       </p:sp>
       <p:sp>
         <p:nvSpPr>
-          <p:cNvPr id="287" name="Google Shape;320;p28">
+          <p:cNvPr id="369" name="Google Shape;597;p36">
             <a:extLst>
               <a:ext uri="{FF2B5EF4-FFF2-40B4-BE49-F238E27FC236}">
-                <a16:creationId xmlns:a16="http://schemas.microsoft.com/office/drawing/2014/main" id="{6644CDC9-F97E-B9CB-AFB0-EFDB9E636F26}"/>
+                <a16:creationId xmlns:a16="http://schemas.microsoft.com/office/drawing/2014/main" id="{4E0D440B-0775-5DC1-86EC-FDCB9A11A8A6}"/>
               </a:ext>
             </a:extLst>
           </p:cNvPr>
-          <p:cNvSpPr txBox="1"/>
+          <p:cNvSpPr>
+            <a:spLocks noChangeAspect="1"/>
+          </p:cNvSpPr>
           <p:nvPr/>
         </p:nvSpPr>
         <p:spPr>
-          <a:xfrm>
-            <a:off x="15981499" y="19158286"/>
-            <a:ext cx="2686568" cy="615523"/>
-          </a:xfrm>
-          <a:prstGeom prst="rect">
+          <a:xfrm rot="16200000">
+            <a:off x="18005289" y="8957723"/>
+            <a:ext cx="177463" cy="164592"/>
+          </a:xfrm>
+          <a:prstGeom prst="ellipse">
             <a:avLst/>
           </a:prstGeom>
-          <a:noFill/>
+          <a:solidFill>
+            <a:srgbClr val="598BC5"/>
+          </a:solidFill>
           <a:ln>
             <a:noFill/>
           </a:ln>
         </p:spPr>
         <p:txBody>
-          <a:bodyPr spcFirstLastPara="1" wrap="square" lIns="91425" tIns="91425" rIns="91425" bIns="91425" anchor="t" anchorCtr="0">
-            <a:spAutoFit/>
+          <a:bodyPr spcFirstLastPara="1" wrap="square" lIns="91425" tIns="91425" rIns="91425" bIns="91425" anchor="ctr" anchorCtr="0">
+            <a:noAutofit/>
           </a:bodyPr>
           <a:lstStyle/>
           <a:p>
@@ -7521,977 +8502,10 @@
               </a:spcAft>
               <a:buNone/>
             </a:pPr>
-            <a:r>
-              <a:rPr lang="en" sz="2800" b="1" dirty="0">
-                <a:latin typeface="Times New Roman" panose="02020603050405020304" pitchFamily="18" charset="0"/>
-                <a:cs typeface="Times New Roman" panose="02020603050405020304" pitchFamily="18" charset="0"/>
-              </a:rPr>
-              <a:t>No</a:t>
-            </a:r>
-            <a:r>
-              <a:rPr lang="en" sz="2800" b="1" i="1" dirty="0">
-                <a:latin typeface="Times New Roman" panose="02020603050405020304" pitchFamily="18" charset="0"/>
-                <a:cs typeface="Times New Roman" panose="02020603050405020304" pitchFamily="18" charset="0"/>
-              </a:rPr>
-              <a:t> L</a:t>
-            </a:r>
-            <a:r>
-              <a:rPr lang="en" sz="2800" b="1" i="1" baseline="-25000" dirty="0">
-                <a:latin typeface="Times New Roman" panose="02020603050405020304" pitchFamily="18" charset="0"/>
-                <a:cs typeface="Times New Roman" panose="02020603050405020304" pitchFamily="18" charset="0"/>
-              </a:rPr>
-              <a:t>A</a:t>
-            </a:r>
-            <a:r>
-              <a:rPr lang="en" sz="2800" b="1" dirty="0">
-                <a:latin typeface="Times New Roman" panose="02020603050405020304" pitchFamily="18" charset="0"/>
-                <a:cs typeface="Times New Roman" panose="02020603050405020304" pitchFamily="18" charset="0"/>
-              </a:rPr>
-              <a:t> Induction</a:t>
-            </a:r>
-            <a:endParaRPr sz="2800" b="1" dirty="0">
-              <a:latin typeface="Times New Roman" panose="02020603050405020304" pitchFamily="18" charset="0"/>
-              <a:cs typeface="Times New Roman" panose="02020603050405020304" pitchFamily="18" charset="0"/>
-            </a:endParaRPr>
-          </a:p>
-        </p:txBody>
-      </p:sp>
-      <p:pic>
-        <p:nvPicPr>
-          <p:cNvPr id="288" name="Picture 287" descr="A picture containing text, screenshot, electric blue, line&#10;&#10;Description automatically generated">
-            <a:extLst>
-              <a:ext uri="{FF2B5EF4-FFF2-40B4-BE49-F238E27FC236}">
-                <a16:creationId xmlns:a16="http://schemas.microsoft.com/office/drawing/2014/main" id="{6BB53E8C-A787-8016-F447-1BD59C9B0C8C}"/>
-              </a:ext>
-            </a:extLst>
-          </p:cNvPr>
-          <p:cNvPicPr>
-            <a:picLocks noChangeAspect="1"/>
-          </p:cNvPicPr>
-          <p:nvPr/>
-        </p:nvPicPr>
-        <p:blipFill rotWithShape="1">
-          <a:blip r:embed="rId23"/>
-          <a:srcRect l="14167" t="6139" r="13129" b="16146"/>
-          <a:stretch/>
-        </p:blipFill>
-        <p:spPr>
-          <a:xfrm>
-            <a:off x="18811908" y="18801584"/>
-            <a:ext cx="2182597" cy="1857740"/>
-          </a:xfrm>
-          <a:prstGeom prst="rect">
-            <a:avLst/>
-          </a:prstGeom>
-        </p:spPr>
-      </p:pic>
-      <p:pic>
-        <p:nvPicPr>
-          <p:cNvPr id="289" name="Picture 288" descr="A picture containing text, screenshot, colorfulness&#10;&#10;Description automatically generated">
-            <a:extLst>
-              <a:ext uri="{FF2B5EF4-FFF2-40B4-BE49-F238E27FC236}">
-                <a16:creationId xmlns:a16="http://schemas.microsoft.com/office/drawing/2014/main" id="{EF9130FD-E367-DAE9-1808-40E325778A29}"/>
-              </a:ext>
-            </a:extLst>
-          </p:cNvPr>
-          <p:cNvPicPr>
-            <a:picLocks noChangeAspect="1"/>
-          </p:cNvPicPr>
-          <p:nvPr/>
-        </p:nvPicPr>
-        <p:blipFill rotWithShape="1">
-          <a:blip r:embed="rId24"/>
-          <a:srcRect l="13787" t="5963" r="12924" b="14147"/>
-          <a:stretch/>
-        </p:blipFill>
-        <p:spPr>
-          <a:xfrm>
-            <a:off x="21050933" y="18814668"/>
-            <a:ext cx="2186233" cy="1897610"/>
-          </a:xfrm>
-          <a:prstGeom prst="rect">
-            <a:avLst/>
-          </a:prstGeom>
-        </p:spPr>
-      </p:pic>
-      <p:pic>
-        <p:nvPicPr>
-          <p:cNvPr id="290" name="Picture 289" descr="A picture containing text, screenshot, colorfulness, font&#10;&#10;Description automatically generated">
-            <a:extLst>
-              <a:ext uri="{FF2B5EF4-FFF2-40B4-BE49-F238E27FC236}">
-                <a16:creationId xmlns:a16="http://schemas.microsoft.com/office/drawing/2014/main" id="{437A0158-D52A-8A74-F301-19DECD227A27}"/>
-              </a:ext>
-            </a:extLst>
-          </p:cNvPr>
-          <p:cNvPicPr>
-            <a:picLocks noChangeAspect="1"/>
-          </p:cNvPicPr>
-          <p:nvPr/>
-        </p:nvPicPr>
-        <p:blipFill rotWithShape="1">
-          <a:blip r:embed="rId25"/>
-          <a:srcRect l="14100" t="6448" r="14545" b="14813"/>
-          <a:stretch/>
-        </p:blipFill>
-        <p:spPr>
-          <a:xfrm>
-            <a:off x="23278065" y="18811175"/>
-            <a:ext cx="2182598" cy="1917795"/>
-          </a:xfrm>
-          <a:prstGeom prst="rect">
-            <a:avLst/>
-          </a:prstGeom>
-        </p:spPr>
-      </p:pic>
-      <p:pic>
-        <p:nvPicPr>
-          <p:cNvPr id="291" name="Picture 290" descr="A picture containing text, screenshot, colorfulness, red&#10;&#10;Description automatically generated">
-            <a:extLst>
-              <a:ext uri="{FF2B5EF4-FFF2-40B4-BE49-F238E27FC236}">
-                <a16:creationId xmlns:a16="http://schemas.microsoft.com/office/drawing/2014/main" id="{8BE64A65-51D9-08F0-4B80-5499D6D78B99}"/>
-              </a:ext>
-            </a:extLst>
-          </p:cNvPr>
-          <p:cNvPicPr>
-            <a:picLocks noChangeAspect="1"/>
-          </p:cNvPicPr>
-          <p:nvPr/>
-        </p:nvPicPr>
-        <p:blipFill rotWithShape="1">
-          <a:blip r:embed="rId26"/>
-          <a:srcRect l="14091" t="5214" r="15433" b="14262"/>
-          <a:stretch/>
-        </p:blipFill>
-        <p:spPr>
-          <a:xfrm>
-            <a:off x="25575656" y="18778258"/>
-            <a:ext cx="2180302" cy="1983627"/>
-          </a:xfrm>
-          <a:prstGeom prst="rect">
-            <a:avLst/>
-          </a:prstGeom>
-        </p:spPr>
-      </p:pic>
-      <p:pic>
-        <p:nvPicPr>
-          <p:cNvPr id="293" name="Picture 292" descr="A picture containing text, screenshot, colorfulness, font&#10;&#10;Description automatically generated">
-            <a:extLst>
-              <a:ext uri="{FF2B5EF4-FFF2-40B4-BE49-F238E27FC236}">
-                <a16:creationId xmlns:a16="http://schemas.microsoft.com/office/drawing/2014/main" id="{4A8B659D-9BFA-5720-EDB2-2BD5982DBA2C}"/>
-              </a:ext>
-            </a:extLst>
-          </p:cNvPr>
-          <p:cNvPicPr>
-            <a:picLocks noChangeAspect="1"/>
-          </p:cNvPicPr>
-          <p:nvPr/>
-        </p:nvPicPr>
-        <p:blipFill rotWithShape="1">
-          <a:blip r:embed="rId27"/>
-          <a:srcRect l="86889" r="579" b="14070"/>
-          <a:stretch/>
-        </p:blipFill>
-        <p:spPr>
-          <a:xfrm>
-            <a:off x="30169914" y="19488490"/>
-            <a:ext cx="778280" cy="4249335"/>
-          </a:xfrm>
-          <a:prstGeom prst="rect">
-            <a:avLst/>
-          </a:prstGeom>
-        </p:spPr>
-      </p:pic>
-      <p:sp>
-        <p:nvSpPr>
-          <p:cNvPr id="294" name="Multiply 293">
-            <a:extLst>
-              <a:ext uri="{FF2B5EF4-FFF2-40B4-BE49-F238E27FC236}">
-                <a16:creationId xmlns:a16="http://schemas.microsoft.com/office/drawing/2014/main" id="{7F7E6342-8AD1-CAF7-888A-D8735E4A80AE}"/>
-              </a:ext>
-            </a:extLst>
-          </p:cNvPr>
-          <p:cNvSpPr/>
-          <p:nvPr/>
-        </p:nvSpPr>
-        <p:spPr>
-          <a:xfrm>
-            <a:off x="16883509" y="19536415"/>
-            <a:ext cx="882548" cy="835624"/>
-          </a:xfrm>
-          <a:prstGeom prst="mathMultiply">
-            <a:avLst/>
-          </a:prstGeom>
-          <a:solidFill>
-            <a:schemeClr val="tx1"/>
-          </a:solidFill>
-          <a:ln>
-            <a:noFill/>
-          </a:ln>
-        </p:spPr>
-        <p:style>
-          <a:lnRef idx="2">
-            <a:schemeClr val="accent1">
-              <a:shade val="50000"/>
-            </a:schemeClr>
-          </a:lnRef>
-          <a:fillRef idx="1">
-            <a:schemeClr val="accent1"/>
-          </a:fillRef>
-          <a:effectRef idx="0">
-            <a:schemeClr val="accent1"/>
-          </a:effectRef>
-          <a:fontRef idx="minor">
-            <a:schemeClr val="lt1"/>
-          </a:fontRef>
-        </p:style>
-        <p:txBody>
-          <a:bodyPr rtlCol="0" anchor="ctr"/>
-          <a:lstStyle/>
-          <a:p>
-            <a:pPr algn="ctr"/>
-            <a:endParaRPr lang="en-US"/>
-          </a:p>
-        </p:txBody>
-      </p:sp>
-      <p:pic>
-        <p:nvPicPr>
-          <p:cNvPr id="295" name="Picture 294">
-            <a:extLst>
-              <a:ext uri="{FF2B5EF4-FFF2-40B4-BE49-F238E27FC236}">
-                <a16:creationId xmlns:a16="http://schemas.microsoft.com/office/drawing/2014/main" id="{418C062C-CEBF-E3C1-C205-6545E6BAFDE4}"/>
-              </a:ext>
-            </a:extLst>
-          </p:cNvPr>
-          <p:cNvPicPr>
-            <a:picLocks noChangeAspect="1"/>
-          </p:cNvPicPr>
-          <p:nvPr/>
-        </p:nvPicPr>
-        <p:blipFill>
-          <a:blip r:embed="rId10"/>
-          <a:stretch>
-            <a:fillRect/>
-          </a:stretch>
-        </p:blipFill>
-        <p:spPr>
-          <a:xfrm>
-            <a:off x="15839651" y="19690523"/>
-            <a:ext cx="2686568" cy="664623"/>
-          </a:xfrm>
-          <a:prstGeom prst="rect">
-            <a:avLst/>
-          </a:prstGeom>
-          <a:ln w="38100">
-            <a:noFill/>
-          </a:ln>
-        </p:spPr>
-      </p:pic>
-      <p:pic>
-        <p:nvPicPr>
-          <p:cNvPr id="297" name="Picture 296">
-            <a:extLst>
-              <a:ext uri="{FF2B5EF4-FFF2-40B4-BE49-F238E27FC236}">
-                <a16:creationId xmlns:a16="http://schemas.microsoft.com/office/drawing/2014/main" id="{898181D4-5FC2-0F7E-1DEF-62AD01C5008D}"/>
-              </a:ext>
-            </a:extLst>
-          </p:cNvPr>
-          <p:cNvPicPr>
-            <a:picLocks noChangeAspect="1"/>
-          </p:cNvPicPr>
-          <p:nvPr/>
-        </p:nvPicPr>
-        <p:blipFill>
-          <a:blip r:embed="rId6"/>
-          <a:stretch>
-            <a:fillRect/>
-          </a:stretch>
-        </p:blipFill>
-        <p:spPr>
-          <a:xfrm>
-            <a:off x="15836794" y="21646757"/>
-            <a:ext cx="2716219" cy="1408272"/>
-          </a:xfrm>
-          <a:prstGeom prst="rect">
-            <a:avLst/>
-          </a:prstGeom>
-        </p:spPr>
-      </p:pic>
-      <p:pic>
-        <p:nvPicPr>
-          <p:cNvPr id="299" name="Picture 298" descr="A picture containing text, screenshot, electric blue, line&#10;&#10;Description automatically generated">
-            <a:extLst>
-              <a:ext uri="{FF2B5EF4-FFF2-40B4-BE49-F238E27FC236}">
-                <a16:creationId xmlns:a16="http://schemas.microsoft.com/office/drawing/2014/main" id="{1213D3D7-AD91-F1FB-FFBA-A3FF0B2C6BB8}"/>
-              </a:ext>
-            </a:extLst>
-          </p:cNvPr>
-          <p:cNvPicPr>
-            <a:picLocks noChangeAspect="1"/>
-          </p:cNvPicPr>
-          <p:nvPr/>
-        </p:nvPicPr>
-        <p:blipFill rotWithShape="1">
-          <a:blip r:embed="rId28"/>
-          <a:srcRect l="15660" t="6446" r="16212" b="14436"/>
-          <a:stretch/>
-        </p:blipFill>
-        <p:spPr>
-          <a:xfrm>
-            <a:off x="18827671" y="20865634"/>
-            <a:ext cx="2129086" cy="1910618"/>
-          </a:xfrm>
-          <a:prstGeom prst="rect">
-            <a:avLst/>
-          </a:prstGeom>
-        </p:spPr>
-      </p:pic>
-      <p:pic>
-        <p:nvPicPr>
-          <p:cNvPr id="301" name="Picture 300" descr="A picture containing text, screenshot, colorfulness, font&#10;&#10;Description automatically generated">
-            <a:extLst>
-              <a:ext uri="{FF2B5EF4-FFF2-40B4-BE49-F238E27FC236}">
-                <a16:creationId xmlns:a16="http://schemas.microsoft.com/office/drawing/2014/main" id="{BDCA6E24-3A89-7B67-32B0-B5FB2BCED315}"/>
-              </a:ext>
-            </a:extLst>
-          </p:cNvPr>
-          <p:cNvPicPr>
-            <a:picLocks noChangeAspect="1"/>
-          </p:cNvPicPr>
-          <p:nvPr/>
-        </p:nvPicPr>
-        <p:blipFill rotWithShape="1">
-          <a:blip r:embed="rId29"/>
-          <a:srcRect l="14766" t="6263" r="14198" b="14731"/>
-          <a:stretch/>
-        </p:blipFill>
-        <p:spPr>
-          <a:xfrm>
-            <a:off x="21029387" y="20876155"/>
-            <a:ext cx="2208038" cy="1897610"/>
-          </a:xfrm>
-          <a:prstGeom prst="rect">
-            <a:avLst/>
-          </a:prstGeom>
-        </p:spPr>
-      </p:pic>
-      <p:pic>
-        <p:nvPicPr>
-          <p:cNvPr id="303" name="Picture 302" descr="A picture containing text, screenshot, colorfulness, font&#10;&#10;Description automatically generated">
-            <a:extLst>
-              <a:ext uri="{FF2B5EF4-FFF2-40B4-BE49-F238E27FC236}">
-                <a16:creationId xmlns:a16="http://schemas.microsoft.com/office/drawing/2014/main" id="{E4A86B8E-FA8C-748C-F975-2F4ED71237FA}"/>
-              </a:ext>
-            </a:extLst>
-          </p:cNvPr>
-          <p:cNvPicPr>
-            <a:picLocks noChangeAspect="1"/>
-          </p:cNvPicPr>
-          <p:nvPr/>
-        </p:nvPicPr>
-        <p:blipFill rotWithShape="1">
-          <a:blip r:embed="rId30"/>
-          <a:srcRect l="6563" t="16252" r="16718" b="16258"/>
-          <a:stretch/>
-        </p:blipFill>
-        <p:spPr>
-          <a:xfrm rot="5400000">
-            <a:off x="23426167" y="20714236"/>
-            <a:ext cx="1917228" cy="2182599"/>
-          </a:xfrm>
-          <a:prstGeom prst="rect">
-            <a:avLst/>
-          </a:prstGeom>
-        </p:spPr>
-      </p:pic>
-      <p:pic>
-        <p:nvPicPr>
-          <p:cNvPr id="305" name="Picture 304" descr="A picture containing text, screenshot, font, colorfulness&#10;&#10;Description automatically generated">
-            <a:extLst>
-              <a:ext uri="{FF2B5EF4-FFF2-40B4-BE49-F238E27FC236}">
-                <a16:creationId xmlns:a16="http://schemas.microsoft.com/office/drawing/2014/main" id="{67D6AAE2-810C-0063-C438-513F9A808B2A}"/>
-              </a:ext>
-            </a:extLst>
-          </p:cNvPr>
-          <p:cNvPicPr>
-            <a:picLocks noChangeAspect="1"/>
-          </p:cNvPicPr>
-          <p:nvPr/>
-        </p:nvPicPr>
-        <p:blipFill rotWithShape="1">
-          <a:blip r:embed="rId31"/>
-          <a:srcRect l="6562" t="16023" r="15805" b="15764"/>
-          <a:stretch/>
-        </p:blipFill>
-        <p:spPr>
-          <a:xfrm rot="5400000">
-            <a:off x="25707883" y="20664649"/>
-            <a:ext cx="1983627" cy="2255564"/>
-          </a:xfrm>
-          <a:prstGeom prst="rect">
-            <a:avLst/>
-          </a:prstGeom>
-        </p:spPr>
-      </p:pic>
-      <p:sp>
-        <p:nvSpPr>
-          <p:cNvPr id="308" name="Google Shape;320;p28">
-            <a:extLst>
-              <a:ext uri="{FF2B5EF4-FFF2-40B4-BE49-F238E27FC236}">
-                <a16:creationId xmlns:a16="http://schemas.microsoft.com/office/drawing/2014/main" id="{73F2A43B-5AE7-A8C9-94A7-8B09C37AD568}"/>
-              </a:ext>
-            </a:extLst>
-          </p:cNvPr>
-          <p:cNvSpPr txBox="1"/>
-          <p:nvPr/>
-        </p:nvSpPr>
-        <p:spPr>
-          <a:xfrm>
-            <a:off x="15888678" y="23425937"/>
-            <a:ext cx="2686568" cy="615523"/>
-          </a:xfrm>
-          <a:prstGeom prst="rect">
-            <a:avLst/>
-          </a:prstGeom>
-          <a:noFill/>
-          <a:ln>
-            <a:noFill/>
-          </a:ln>
-        </p:spPr>
-        <p:txBody>
-          <a:bodyPr spcFirstLastPara="1" wrap="square" lIns="91425" tIns="91425" rIns="91425" bIns="91425" anchor="t" anchorCtr="0">
-            <a:spAutoFit/>
-          </a:bodyPr>
-          <a:lstStyle/>
-          <a:p>
-            <a:pPr marL="0" lvl="0" indent="0" algn="l" rtl="0">
-              <a:spcBef>
-                <a:spcPts val="0"/>
-              </a:spcBef>
-              <a:spcAft>
-                <a:spcPts val="0"/>
-              </a:spcAft>
-              <a:buNone/>
-            </a:pPr>
-            <a:r>
-              <a:rPr lang="en" sz="2800" b="1" dirty="0">
-                <a:latin typeface="Times New Roman" panose="02020603050405020304" pitchFamily="18" charset="0"/>
-                <a:cs typeface="Times New Roman" panose="02020603050405020304" pitchFamily="18" charset="0"/>
-              </a:rPr>
-              <a:t>No</a:t>
-            </a:r>
-            <a:r>
-              <a:rPr lang="en" sz="2800" b="1" i="1" dirty="0">
-                <a:latin typeface="Times New Roman" panose="02020603050405020304" pitchFamily="18" charset="0"/>
-                <a:cs typeface="Times New Roman" panose="02020603050405020304" pitchFamily="18" charset="0"/>
-              </a:rPr>
-              <a:t> L</a:t>
-            </a:r>
-            <a:r>
-              <a:rPr lang="en" sz="2800" b="1" i="1" baseline="-25000" dirty="0">
-                <a:latin typeface="Times New Roman" panose="02020603050405020304" pitchFamily="18" charset="0"/>
-                <a:cs typeface="Times New Roman" panose="02020603050405020304" pitchFamily="18" charset="0"/>
-              </a:rPr>
-              <a:t>B</a:t>
-            </a:r>
-            <a:r>
-              <a:rPr lang="en" sz="2800" b="1" dirty="0">
-                <a:latin typeface="Times New Roman" panose="02020603050405020304" pitchFamily="18" charset="0"/>
-                <a:cs typeface="Times New Roman" panose="02020603050405020304" pitchFamily="18" charset="0"/>
-              </a:rPr>
-              <a:t> Induction</a:t>
-            </a:r>
-            <a:endParaRPr sz="2800" b="1" dirty="0">
-              <a:latin typeface="Times New Roman" panose="02020603050405020304" pitchFamily="18" charset="0"/>
-              <a:cs typeface="Times New Roman" panose="02020603050405020304" pitchFamily="18" charset="0"/>
-            </a:endParaRPr>
-          </a:p>
-        </p:txBody>
-      </p:sp>
-      <p:pic>
-        <p:nvPicPr>
-          <p:cNvPr id="309" name="Picture 308">
-            <a:extLst>
-              <a:ext uri="{FF2B5EF4-FFF2-40B4-BE49-F238E27FC236}">
-                <a16:creationId xmlns:a16="http://schemas.microsoft.com/office/drawing/2014/main" id="{2BCE7B75-E4A5-5F43-6D82-6B97BEA19209}"/>
-              </a:ext>
-            </a:extLst>
-          </p:cNvPr>
-          <p:cNvPicPr>
-            <a:picLocks noChangeAspect="1"/>
-          </p:cNvPicPr>
-          <p:nvPr/>
-        </p:nvPicPr>
-        <p:blipFill>
-          <a:blip r:embed="rId32"/>
-          <a:stretch>
-            <a:fillRect/>
-          </a:stretch>
-        </p:blipFill>
-        <p:spPr>
-          <a:xfrm>
-            <a:off x="15871711" y="23937289"/>
-            <a:ext cx="2743040" cy="682946"/>
-          </a:xfrm>
-          <a:prstGeom prst="rect">
-            <a:avLst/>
-          </a:prstGeom>
-        </p:spPr>
-      </p:pic>
-      <p:pic>
-        <p:nvPicPr>
-          <p:cNvPr id="310" name="Picture 309" descr="A picture containing text, screenshot, colorfulness, font&#10;&#10;Description automatically generated">
-            <a:extLst>
-              <a:ext uri="{FF2B5EF4-FFF2-40B4-BE49-F238E27FC236}">
-                <a16:creationId xmlns:a16="http://schemas.microsoft.com/office/drawing/2014/main" id="{1AAB032C-B1B6-FB32-F639-FFFF89E8C8C2}"/>
-              </a:ext>
-            </a:extLst>
-          </p:cNvPr>
-          <p:cNvPicPr>
-            <a:picLocks noChangeAspect="1"/>
-          </p:cNvPicPr>
-          <p:nvPr/>
-        </p:nvPicPr>
-        <p:blipFill rotWithShape="1">
-          <a:blip r:embed="rId27"/>
-          <a:srcRect l="13601" t="5668" r="13484" b="14334"/>
-          <a:stretch/>
-        </p:blipFill>
-        <p:spPr>
-          <a:xfrm>
-            <a:off x="27900101" y="18778258"/>
-            <a:ext cx="2258966" cy="1973498"/>
-          </a:xfrm>
-          <a:prstGeom prst="rect">
-            <a:avLst/>
-          </a:prstGeom>
-        </p:spPr>
-      </p:pic>
-      <p:pic>
-        <p:nvPicPr>
-          <p:cNvPr id="311" name="Picture 310" descr="A picture containing text, screenshot, colorfulness, font&#10;&#10;Description automatically generated">
-            <a:extLst>
-              <a:ext uri="{FF2B5EF4-FFF2-40B4-BE49-F238E27FC236}">
-                <a16:creationId xmlns:a16="http://schemas.microsoft.com/office/drawing/2014/main" id="{696258D4-E72A-2069-960F-B5098AEE19AD}"/>
-              </a:ext>
-            </a:extLst>
-          </p:cNvPr>
-          <p:cNvPicPr>
-            <a:picLocks noChangeAspect="1"/>
-          </p:cNvPicPr>
-          <p:nvPr/>
-        </p:nvPicPr>
-        <p:blipFill rotWithShape="1">
-          <a:blip r:embed="rId33"/>
-          <a:srcRect l="6562" t="16252" r="15670" b="15764"/>
-          <a:stretch/>
-        </p:blipFill>
-        <p:spPr>
-          <a:xfrm rot="5400000">
-            <a:off x="28123479" y="20715486"/>
-            <a:ext cx="1954271" cy="2210914"/>
-          </a:xfrm>
-          <a:prstGeom prst="rect">
-            <a:avLst/>
-          </a:prstGeom>
-        </p:spPr>
-      </p:pic>
-      <p:pic>
-        <p:nvPicPr>
-          <p:cNvPr id="329" name="Picture 328" descr="A picture containing text, screenshot, electric blue, line&#10;&#10;Description automatically generated">
-            <a:extLst>
-              <a:ext uri="{FF2B5EF4-FFF2-40B4-BE49-F238E27FC236}">
-                <a16:creationId xmlns:a16="http://schemas.microsoft.com/office/drawing/2014/main" id="{0ABDE973-1C67-60E0-A780-03A48D8767B3}"/>
-              </a:ext>
-            </a:extLst>
-          </p:cNvPr>
-          <p:cNvPicPr>
-            <a:picLocks noChangeAspect="1"/>
-          </p:cNvPicPr>
-          <p:nvPr/>
-        </p:nvPicPr>
-        <p:blipFill rotWithShape="1">
-          <a:blip r:embed="rId34"/>
-          <a:srcRect l="6562" t="16435" r="15670" b="15567"/>
-          <a:stretch/>
-        </p:blipFill>
-        <p:spPr>
-          <a:xfrm rot="5400000">
-            <a:off x="18929433" y="22835738"/>
-            <a:ext cx="1928857" cy="2182597"/>
-          </a:xfrm>
-          <a:prstGeom prst="rect">
-            <a:avLst/>
-          </a:prstGeom>
-        </p:spPr>
-      </p:pic>
-      <p:pic>
-        <p:nvPicPr>
-          <p:cNvPr id="331" name="Picture 330" descr="A picture containing text, screenshot, electric blue, line&#10;&#10;Description automatically generated">
-            <a:extLst>
-              <a:ext uri="{FF2B5EF4-FFF2-40B4-BE49-F238E27FC236}">
-                <a16:creationId xmlns:a16="http://schemas.microsoft.com/office/drawing/2014/main" id="{B58F3B54-DCFE-E426-D9B1-DFF1C0404A50}"/>
-              </a:ext>
-            </a:extLst>
-          </p:cNvPr>
-          <p:cNvPicPr>
-            <a:picLocks noChangeAspect="1"/>
-          </p:cNvPicPr>
-          <p:nvPr/>
-        </p:nvPicPr>
-        <p:blipFill rotWithShape="1">
-          <a:blip r:embed="rId35"/>
-          <a:srcRect l="5821" t="15420" r="15206" b="15042"/>
-          <a:stretch/>
-        </p:blipFill>
-        <p:spPr>
-          <a:xfrm rot="5400000">
-            <a:off x="21121610" y="22792655"/>
-            <a:ext cx="1974726" cy="2250265"/>
-          </a:xfrm>
-          <a:prstGeom prst="rect">
-            <a:avLst/>
-          </a:prstGeom>
-        </p:spPr>
-      </p:pic>
-      <p:pic>
-        <p:nvPicPr>
-          <p:cNvPr id="333" name="Picture 332" descr="A picture containing text, screenshot, electric blue, line&#10;&#10;Description automatically generated">
-            <a:extLst>
-              <a:ext uri="{FF2B5EF4-FFF2-40B4-BE49-F238E27FC236}">
-                <a16:creationId xmlns:a16="http://schemas.microsoft.com/office/drawing/2014/main" id="{EA74ECC1-DACC-59A8-0B18-5C6E9103C2C0}"/>
-              </a:ext>
-            </a:extLst>
-          </p:cNvPr>
-          <p:cNvPicPr>
-            <a:picLocks noChangeAspect="1"/>
-          </p:cNvPicPr>
-          <p:nvPr/>
-        </p:nvPicPr>
-        <p:blipFill rotWithShape="1">
-          <a:blip r:embed="rId36"/>
-          <a:srcRect l="6563" t="16435" r="16640" b="15985"/>
-          <a:stretch/>
-        </p:blipFill>
-        <p:spPr>
-          <a:xfrm rot="5400000">
-            <a:off x="23437042" y="22839116"/>
-            <a:ext cx="1970649" cy="2244176"/>
-          </a:xfrm>
-          <a:prstGeom prst="rect">
-            <a:avLst/>
-          </a:prstGeom>
-        </p:spPr>
-      </p:pic>
-      <p:pic>
-        <p:nvPicPr>
-          <p:cNvPr id="335" name="Picture 334" descr="A picture containing text, screenshot, electric blue, line&#10;&#10;Description automatically generated">
-            <a:extLst>
-              <a:ext uri="{FF2B5EF4-FFF2-40B4-BE49-F238E27FC236}">
-                <a16:creationId xmlns:a16="http://schemas.microsoft.com/office/drawing/2014/main" id="{35FC57F2-FCCC-3463-2E3A-492C8200446E}"/>
-              </a:ext>
-            </a:extLst>
-          </p:cNvPr>
-          <p:cNvPicPr>
-            <a:picLocks noChangeAspect="1"/>
-          </p:cNvPicPr>
-          <p:nvPr/>
-        </p:nvPicPr>
-        <p:blipFill rotWithShape="1">
-          <a:blip r:embed="rId37"/>
-          <a:srcRect l="6562" t="15530" r="16227" b="15373"/>
-          <a:stretch/>
-        </p:blipFill>
-        <p:spPr>
-          <a:xfrm rot="5400000">
-            <a:off x="25686894" y="22783145"/>
-            <a:ext cx="2044455" cy="2367747"/>
-          </a:xfrm>
-          <a:prstGeom prst="rect">
-            <a:avLst/>
-          </a:prstGeom>
-        </p:spPr>
-      </p:pic>
-      <p:pic>
-        <p:nvPicPr>
-          <p:cNvPr id="337" name="Picture 336" descr="A picture containing text, screenshot, electric blue, line&#10;&#10;Description automatically generated">
-            <a:extLst>
-              <a:ext uri="{FF2B5EF4-FFF2-40B4-BE49-F238E27FC236}">
-                <a16:creationId xmlns:a16="http://schemas.microsoft.com/office/drawing/2014/main" id="{EADCD86D-709B-0658-C1CC-A4BF000AB6B8}"/>
-              </a:ext>
-            </a:extLst>
-          </p:cNvPr>
-          <p:cNvPicPr>
-            <a:picLocks noChangeAspect="1"/>
-          </p:cNvPicPr>
-          <p:nvPr/>
-        </p:nvPicPr>
-        <p:blipFill rotWithShape="1">
-          <a:blip r:embed="rId38"/>
-          <a:srcRect l="6562" t="16667" r="16762" b="15041"/>
-          <a:stretch/>
-        </p:blipFill>
-        <p:spPr>
-          <a:xfrm rot="5400000">
-            <a:off x="28049243" y="22824270"/>
-            <a:ext cx="2054211" cy="2367748"/>
-          </a:xfrm>
-          <a:prstGeom prst="rect">
-            <a:avLst/>
-          </a:prstGeom>
-        </p:spPr>
-      </p:pic>
-      <p:sp>
-        <p:nvSpPr>
-          <p:cNvPr id="338" name="TextBox 337">
-            <a:extLst>
-              <a:ext uri="{FF2B5EF4-FFF2-40B4-BE49-F238E27FC236}">
-                <a16:creationId xmlns:a16="http://schemas.microsoft.com/office/drawing/2014/main" id="{3169AE45-18AB-A658-2202-AE0B7599E938}"/>
-              </a:ext>
-            </a:extLst>
-          </p:cNvPr>
-          <p:cNvSpPr txBox="1"/>
-          <p:nvPr/>
-        </p:nvSpPr>
-        <p:spPr>
-          <a:xfrm>
-            <a:off x="15610041" y="18714728"/>
-            <a:ext cx="911292" cy="638720"/>
-          </a:xfrm>
-          <a:prstGeom prst="rect">
-            <a:avLst/>
-          </a:prstGeom>
-          <a:noFill/>
-        </p:spPr>
-        <p:txBody>
-          <a:bodyPr wrap="square" rtlCol="0">
-            <a:spAutoFit/>
-          </a:bodyPr>
-          <a:lstStyle/>
-          <a:p>
-            <a:pPr algn="ctr"/>
-            <a:r>
-              <a:rPr lang="en-US" sz="3000" b="1" dirty="0">
-                <a:latin typeface="Times New Roman" panose="02020603050405020304" pitchFamily="18" charset="0"/>
-                <a:cs typeface="Times New Roman" panose="02020603050405020304" pitchFamily="18" charset="0"/>
-              </a:rPr>
-              <a:t>(a)</a:t>
-            </a:r>
-          </a:p>
-        </p:txBody>
-      </p:sp>
-      <p:sp>
-        <p:nvSpPr>
-          <p:cNvPr id="339" name="TextBox 338">
-            <a:extLst>
-              <a:ext uri="{FF2B5EF4-FFF2-40B4-BE49-F238E27FC236}">
-                <a16:creationId xmlns:a16="http://schemas.microsoft.com/office/drawing/2014/main" id="{39947C1F-ECD1-637D-046C-4793A8ED95E2}"/>
-              </a:ext>
-            </a:extLst>
-          </p:cNvPr>
-          <p:cNvSpPr txBox="1"/>
-          <p:nvPr/>
-        </p:nvSpPr>
-        <p:spPr>
-          <a:xfrm>
-            <a:off x="15566127" y="20653041"/>
-            <a:ext cx="911292" cy="553998"/>
-          </a:xfrm>
-          <a:prstGeom prst="rect">
-            <a:avLst/>
-          </a:prstGeom>
-          <a:noFill/>
-        </p:spPr>
-        <p:txBody>
-          <a:bodyPr wrap="square" rtlCol="0">
-            <a:spAutoFit/>
-          </a:bodyPr>
-          <a:lstStyle/>
-          <a:p>
-            <a:pPr algn="ctr"/>
-            <a:r>
-              <a:rPr lang="en-US" sz="3000" b="1" dirty="0">
-                <a:latin typeface="Times New Roman" panose="02020603050405020304" pitchFamily="18" charset="0"/>
-                <a:cs typeface="Times New Roman" panose="02020603050405020304" pitchFamily="18" charset="0"/>
-              </a:rPr>
-              <a:t>(b)</a:t>
-            </a:r>
-          </a:p>
-        </p:txBody>
-      </p:sp>
-      <p:sp>
-        <p:nvSpPr>
-          <p:cNvPr id="340" name="TextBox 339">
-            <a:extLst>
-              <a:ext uri="{FF2B5EF4-FFF2-40B4-BE49-F238E27FC236}">
-                <a16:creationId xmlns:a16="http://schemas.microsoft.com/office/drawing/2014/main" id="{A83E60F8-017E-E845-A80B-51C989C85263}"/>
-              </a:ext>
-            </a:extLst>
-          </p:cNvPr>
-          <p:cNvSpPr txBox="1"/>
-          <p:nvPr/>
-        </p:nvSpPr>
-        <p:spPr>
-          <a:xfrm>
-            <a:off x="15541651" y="22928404"/>
-            <a:ext cx="911292" cy="553998"/>
-          </a:xfrm>
-          <a:prstGeom prst="rect">
-            <a:avLst/>
-          </a:prstGeom>
-          <a:noFill/>
-        </p:spPr>
-        <p:txBody>
-          <a:bodyPr wrap="square" rtlCol="0">
-            <a:spAutoFit/>
-          </a:bodyPr>
-          <a:lstStyle/>
-          <a:p>
-            <a:pPr algn="ctr"/>
-            <a:r>
-              <a:rPr lang="en-US" sz="3000" b="1" dirty="0">
-                <a:latin typeface="Times New Roman" panose="02020603050405020304" pitchFamily="18" charset="0"/>
-                <a:cs typeface="Times New Roman" panose="02020603050405020304" pitchFamily="18" charset="0"/>
-              </a:rPr>
-              <a:t>(c)</a:t>
-            </a:r>
-          </a:p>
-        </p:txBody>
-      </p:sp>
-      <p:sp>
-        <p:nvSpPr>
-          <p:cNvPr id="346" name="TextBox 345">
-            <a:extLst>
-              <a:ext uri="{FF2B5EF4-FFF2-40B4-BE49-F238E27FC236}">
-                <a16:creationId xmlns:a16="http://schemas.microsoft.com/office/drawing/2014/main" id="{A831D85A-6113-F851-0B6F-42C07B5F3682}"/>
-              </a:ext>
-            </a:extLst>
-          </p:cNvPr>
-          <p:cNvSpPr txBox="1"/>
-          <p:nvPr/>
-        </p:nvSpPr>
-        <p:spPr>
-          <a:xfrm>
-            <a:off x="159994" y="32082114"/>
-            <a:ext cx="15177565" cy="2246769"/>
-          </a:xfrm>
-          <a:prstGeom prst="rect">
-            <a:avLst/>
-          </a:prstGeom>
-          <a:noFill/>
-        </p:spPr>
-        <p:txBody>
-          <a:bodyPr wrap="square" rtlCol="0">
-            <a:spAutoFit/>
-          </a:bodyPr>
-          <a:lstStyle/>
-          <a:p>
-            <a:r>
-              <a:rPr lang="en-US" sz="2800" b="1" dirty="0">
-                <a:latin typeface="Avenir Book" panose="02000503020000020003" pitchFamily="2" charset="0"/>
-              </a:rPr>
-              <a:t>Figure 3. Steady-state trade off between growth and induction. (a) </a:t>
-            </a:r>
-            <a:r>
-              <a:rPr lang="en-US" sz="2800" dirty="0">
-                <a:latin typeface="Avenir Book" panose="02000503020000020003" pitchFamily="2" charset="0"/>
-              </a:rPr>
-              <a:t>For the steady-state lysogen population to remain constant, the growth rate must increase with increasing induction rate (black line). </a:t>
-            </a:r>
-            <a:r>
-              <a:rPr lang="en-US" sz="2800" b="1" dirty="0">
-                <a:latin typeface="Avenir Book" panose="02000503020000020003" pitchFamily="2" charset="0"/>
-              </a:rPr>
-              <a:t>(b)</a:t>
-            </a:r>
-            <a:r>
-              <a:rPr lang="en-US" sz="2800" dirty="0">
-                <a:latin typeface="Avenir Book" panose="02000503020000020003" pitchFamily="2" charset="0"/>
-              </a:rPr>
-              <a:t> The steady-state phage population </a:t>
-            </a:r>
-            <a:r>
-              <a:rPr kumimoji="0" lang="en-US" sz="2800" b="0" i="0" u="none" strike="noStrike" kern="1200" cap="none" spc="0" normalizeH="0" baseline="0" noProof="0" dirty="0">
-                <a:ln>
-                  <a:noFill/>
-                </a:ln>
-                <a:solidFill>
-                  <a:prstClr val="black"/>
-                </a:solidFill>
-                <a:effectLst/>
-                <a:uLnTx/>
-                <a:uFillTx/>
-                <a:latin typeface="Avenir Book" panose="02000503020000020003" pitchFamily="2" charset="0"/>
-                <a:ea typeface="+mn-ea"/>
-                <a:cs typeface="+mn-cs"/>
-              </a:rPr>
-              <a:t>increases with increasing induction. We perform invasion analysis from this growth-induction trade off to show the role of free phage given a fixed lysogen population density.</a:t>
-            </a:r>
-            <a:endParaRPr lang="en-US" sz="2800" dirty="0">
-              <a:latin typeface="Avenir Book" panose="02000503020000020003" pitchFamily="2" charset="0"/>
-            </a:endParaRPr>
-          </a:p>
-        </p:txBody>
-      </p:sp>
-      <p:pic>
-        <p:nvPicPr>
-          <p:cNvPr id="348" name="Picture 347">
-            <a:extLst>
-              <a:ext uri="{FF2B5EF4-FFF2-40B4-BE49-F238E27FC236}">
-                <a16:creationId xmlns:a16="http://schemas.microsoft.com/office/drawing/2014/main" id="{0FED1BE1-A7A5-82D0-C552-E4701FAC45D5}"/>
-              </a:ext>
-            </a:extLst>
-          </p:cNvPr>
-          <p:cNvPicPr>
-            <a:picLocks noChangeAspect="1"/>
-          </p:cNvPicPr>
-          <p:nvPr/>
-        </p:nvPicPr>
-        <p:blipFill>
-          <a:blip r:embed="rId39"/>
-          <a:stretch>
-            <a:fillRect/>
-          </a:stretch>
-        </p:blipFill>
-        <p:spPr>
-          <a:xfrm>
-            <a:off x="15770811" y="7014686"/>
-            <a:ext cx="1383304" cy="923295"/>
-          </a:xfrm>
-          <a:prstGeom prst="rect">
-            <a:avLst/>
-          </a:prstGeom>
-        </p:spPr>
-      </p:pic>
-      <p:pic>
-        <p:nvPicPr>
-          <p:cNvPr id="355" name="Picture 354" descr="A qr code with a cat&#10;&#10;Description automatically generated">
-            <a:extLst>
-              <a:ext uri="{FF2B5EF4-FFF2-40B4-BE49-F238E27FC236}">
-                <a16:creationId xmlns:a16="http://schemas.microsoft.com/office/drawing/2014/main" id="{09CC06D3-3276-C10A-A867-5BC6E7207BEF}"/>
-              </a:ext>
-            </a:extLst>
-          </p:cNvPr>
-          <p:cNvPicPr>
-            <a:picLocks noChangeAspect="1"/>
-          </p:cNvPicPr>
-          <p:nvPr/>
-        </p:nvPicPr>
-        <p:blipFill>
-          <a:blip r:embed="rId40"/>
-          <a:stretch>
-            <a:fillRect/>
-          </a:stretch>
-        </p:blipFill>
-        <p:spPr>
-          <a:xfrm>
-            <a:off x="329375" y="3717360"/>
-            <a:ext cx="1938528" cy="1938528"/>
-          </a:xfrm>
-          <a:prstGeom prst="rect">
-            <a:avLst/>
-          </a:prstGeom>
-        </p:spPr>
-      </p:pic>
+            <a:endParaRPr/>
+          </a:p>
+        </p:txBody>
+      </p:sp>
     </p:spTree>
     <p:extLst>
       <p:ext uri="{BB962C8B-B14F-4D97-AF65-F5344CB8AC3E}">

</xml_diff>